<commit_message>
Add notes to powerpoint
</commit_message>
<xml_diff>
--- a/ProgrammingWithPython.pptx
+++ b/ProgrammingWithPython.pptx
@@ -234,7 +234,7 @@
           <a:p>
             <a:fld id="{19104133-B5B0-4351-8158-4F0E5EB1E2BF}" type="datetimeFigureOut">
               <a:rPr lang="en-US" smtClean="0"/>
-              <a:t>5/29/2019</a:t>
+              <a:t>6/5/2019</a:t>
             </a:fld>
             <a:endParaRPr lang="en-US"/>
           </a:p>
@@ -548,11 +548,20 @@
           <a:p>
             <a:r>
               <a:rPr lang="en-US" dirty="0" smtClean="0"/>
-              <a:t>Ask</a:t>
+              <a:t>Students should write down questions</a:t>
             </a:r>
             <a:r>
               <a:rPr lang="en-US" baseline="0" dirty="0" smtClean="0"/>
-              <a:t> students if they know anything about Python or programming. Ask them to guess how Python got its name</a:t>
+              <a:t> on post-it notes. Instructors can collect the post it notes. Then, one-by-one, each student will tell the group their name, their school, their grade level, and their answer to a random question.</a:t>
+            </a:r>
+          </a:p>
+          <a:p>
+            <a:endParaRPr lang="en-US" baseline="0" dirty="0" smtClean="0"/>
+          </a:p>
+          <a:p>
+            <a:r>
+              <a:rPr lang="en-US" baseline="0" dirty="0" smtClean="0"/>
+              <a:t>It can also be helpful to give candy to each student as they answer.</a:t>
             </a:r>
             <a:endParaRPr lang="en-US" dirty="0"/>
           </a:p>
@@ -575,7 +584,7 @@
           <a:p>
             <a:fld id="{DEC8F7F9-57EC-49CF-9FCD-2B781E4B449F}" type="slidenum">
               <a:rPr lang="en-US" smtClean="0"/>
-              <a:t>5</a:t>
+              <a:t>3</a:t>
             </a:fld>
             <a:endParaRPr lang="en-US"/>
           </a:p>
@@ -584,7 +593,7 @@
     </p:spTree>
     <p:extLst>
       <p:ext uri="{BB962C8B-B14F-4D97-AF65-F5344CB8AC3E}">
-        <p14:creationId xmlns:p14="http://schemas.microsoft.com/office/powerpoint/2010/main" val="2340305351"/>
+        <p14:creationId xmlns:p14="http://schemas.microsoft.com/office/powerpoint/2010/main" val="575715285"/>
       </p:ext>
     </p:extLst>
   </p:cSld>
@@ -640,13 +649,45 @@
           <a:p>
             <a:r>
               <a:rPr lang="en-US" dirty="0" smtClean="0"/>
-              <a:t>Walk through the example</a:t>
+              <a:t>Explain</a:t>
             </a:r>
             <a:r>
               <a:rPr lang="en-US" baseline="0" dirty="0" smtClean="0"/>
-              <a:t> line by line</a:t>
-            </a:r>
-            <a:endParaRPr lang="en-US" dirty="0"/>
+              <a:t> this example in terms of cubbyholes – </a:t>
+            </a:r>
+            <a:r>
+              <a:rPr lang="en-US" b="1" baseline="0" dirty="0" err="1" smtClean="0"/>
+              <a:t>my_name</a:t>
+            </a:r>
+            <a:r>
+              <a:rPr lang="en-US" b="0" baseline="0" dirty="0" smtClean="0"/>
+              <a:t> is like the name on the mailbox, and </a:t>
+            </a:r>
+            <a:r>
+              <a:rPr lang="en-US" b="1" baseline="0" dirty="0" err="1" smtClean="0"/>
+              <a:t>my_name</a:t>
+            </a:r>
+            <a:r>
+              <a:rPr lang="en-US" b="1" baseline="0" dirty="0" smtClean="0"/>
+              <a:t> = “Sam”</a:t>
+            </a:r>
+            <a:r>
+              <a:rPr lang="en-US" b="0" baseline="0" dirty="0" smtClean="0"/>
+              <a:t> is like putting some mail in the mailbox. Then, </a:t>
+            </a:r>
+            <a:r>
+              <a:rPr lang="en-US" b="0" i="1" baseline="0" dirty="0" smtClean="0"/>
+              <a:t>using</a:t>
+            </a:r>
+            <a:r>
+              <a:rPr lang="en-US" b="0" i="1" u="none" baseline="0" dirty="0" smtClean="0"/>
+              <a:t> </a:t>
+            </a:r>
+            <a:r>
+              <a:rPr lang="en-US" b="0" i="0" u="none" baseline="0" dirty="0" smtClean="0"/>
+              <a:t>the variable is like peeking into the mailbox to see what’s in there.</a:t>
+            </a:r>
+            <a:endParaRPr lang="en-US" b="1" dirty="0"/>
           </a:p>
         </p:txBody>
       </p:sp>
@@ -667,7 +708,7 @@
           <a:p>
             <a:fld id="{DEC8F7F9-57EC-49CF-9FCD-2B781E4B449F}" type="slidenum">
               <a:rPr lang="en-US" smtClean="0"/>
-              <a:t>19</a:t>
+              <a:t>13</a:t>
             </a:fld>
             <a:endParaRPr lang="en-US"/>
           </a:p>
@@ -676,7 +717,7 @@
     </p:spTree>
     <p:extLst>
       <p:ext uri="{BB962C8B-B14F-4D97-AF65-F5344CB8AC3E}">
-        <p14:creationId xmlns:p14="http://schemas.microsoft.com/office/powerpoint/2010/main" val="874223267"/>
+        <p14:creationId xmlns:p14="http://schemas.microsoft.com/office/powerpoint/2010/main" val="3055173462"/>
       </p:ext>
     </p:extLst>
   </p:cSld>
@@ -730,6 +771,14 @@
           <a:bodyPr/>
           <a:lstStyle/>
           <a:p>
+            <a:r>
+              <a:rPr lang="en-US" dirty="0" smtClean="0"/>
+              <a:t>Explain that in a real life conversation, people ask questions and remember what the other person says. A computer program works in the same way; it asks questions to the user, and remembers their answers! In</a:t>
+            </a:r>
+            <a:r>
+              <a:rPr lang="en-US" baseline="0" dirty="0" smtClean="0"/>
+              <a:t> Python, the answers the user enters are stored within variables.</a:t>
+            </a:r>
             <a:endParaRPr lang="en-US" dirty="0"/>
           </a:p>
         </p:txBody>
@@ -751,7 +800,7 @@
           <a:p>
             <a:fld id="{DEC8F7F9-57EC-49CF-9FCD-2B781E4B449F}" type="slidenum">
               <a:rPr lang="en-US" smtClean="0"/>
-              <a:t>22</a:t>
+              <a:t>14</a:t>
             </a:fld>
             <a:endParaRPr lang="en-US"/>
           </a:p>
@@ -760,7 +809,7 @@
     </p:spTree>
     <p:extLst>
       <p:ext uri="{BB962C8B-B14F-4D97-AF65-F5344CB8AC3E}">
-        <p14:creationId xmlns:p14="http://schemas.microsoft.com/office/powerpoint/2010/main" val="2995987653"/>
+        <p14:creationId xmlns:p14="http://schemas.microsoft.com/office/powerpoint/2010/main" val="1674417103"/>
       </p:ext>
     </p:extLst>
   </p:cSld>
@@ -814,6 +863,14 @@
           <a:bodyPr/>
           <a:lstStyle/>
           <a:p>
+            <a:r>
+              <a:rPr lang="en-US" dirty="0" smtClean="0"/>
+              <a:t>Ask the students what they think this will do. Allow the</a:t>
+            </a:r>
+            <a:r>
+              <a:rPr lang="en-US" baseline="0" dirty="0" smtClean="0"/>
+              <a:t> students to enter this code in trinket to see what happens.</a:t>
+            </a:r>
             <a:endParaRPr lang="en-US" dirty="0"/>
           </a:p>
         </p:txBody>
@@ -835,7 +892,7 @@
           <a:p>
             <a:fld id="{DEC8F7F9-57EC-49CF-9FCD-2B781E4B449F}" type="slidenum">
               <a:rPr lang="en-US" smtClean="0"/>
-              <a:t>23</a:t>
+              <a:t>15</a:t>
             </a:fld>
             <a:endParaRPr lang="en-US"/>
           </a:p>
@@ -844,7 +901,7 @@
     </p:spTree>
     <p:extLst>
       <p:ext uri="{BB962C8B-B14F-4D97-AF65-F5344CB8AC3E}">
-        <p14:creationId xmlns:p14="http://schemas.microsoft.com/office/powerpoint/2010/main" val="3921428091"/>
+        <p14:creationId xmlns:p14="http://schemas.microsoft.com/office/powerpoint/2010/main" val="3545613084"/>
       </p:ext>
     </p:extLst>
   </p:cSld>
@@ -898,6 +955,22 @@
           <a:bodyPr/>
           <a:lstStyle/>
           <a:p>
+            <a:r>
+              <a:rPr lang="en-US" dirty="0" smtClean="0"/>
+              <a:t>Walk</a:t>
+            </a:r>
+            <a:r>
+              <a:rPr lang="en-US" baseline="0" dirty="0" smtClean="0"/>
+              <a:t> through the example line by line. Explain that whatever the user enters will be stored in the </a:t>
+            </a:r>
+            <a:r>
+              <a:rPr lang="en-US" i="1" baseline="0" dirty="0" smtClean="0"/>
+              <a:t>name</a:t>
+            </a:r>
+            <a:r>
+              <a:rPr lang="en-US" i="0" baseline="0" dirty="0" smtClean="0"/>
+              <a:t> variable.</a:t>
+            </a:r>
             <a:endParaRPr lang="en-US" dirty="0"/>
           </a:p>
         </p:txBody>
@@ -919,7 +992,7 @@
           <a:p>
             <a:fld id="{DEC8F7F9-57EC-49CF-9FCD-2B781E4B449F}" type="slidenum">
               <a:rPr lang="en-US" smtClean="0"/>
-              <a:t>24</a:t>
+              <a:t>16</a:t>
             </a:fld>
             <a:endParaRPr lang="en-US"/>
           </a:p>
@@ -928,7 +1001,629 @@
     </p:spTree>
     <p:extLst>
       <p:ext uri="{BB962C8B-B14F-4D97-AF65-F5344CB8AC3E}">
-        <p14:creationId xmlns:p14="http://schemas.microsoft.com/office/powerpoint/2010/main" val="3310518321"/>
+        <p14:creationId xmlns:p14="http://schemas.microsoft.com/office/powerpoint/2010/main" val="568709894"/>
+      </p:ext>
+    </p:extLst>
+  </p:cSld>
+  <p:clrMapOvr>
+    <a:masterClrMapping/>
+  </p:clrMapOvr>
+</p:notes>
+</file>
+
+<file path=ppt/notesSlides/notesSlide14.xml><?xml version="1.0" encoding="utf-8"?>
+<p:notes xmlns:a="http://schemas.openxmlformats.org/drawingml/2006/main" xmlns:r="http://schemas.openxmlformats.org/officeDocument/2006/relationships" xmlns:p="http://schemas.openxmlformats.org/presentationml/2006/main">
+  <p:cSld>
+    <p:spTree>
+      <p:nvGrpSpPr>
+        <p:cNvPr id="1" name=""/>
+        <p:cNvGrpSpPr/>
+        <p:nvPr/>
+      </p:nvGrpSpPr>
+      <p:grpSpPr>
+        <a:xfrm>
+          <a:off x="0" y="0"/>
+          <a:ext cx="0" cy="0"/>
+          <a:chOff x="0" y="0"/>
+          <a:chExt cx="0" cy="0"/>
+        </a:xfrm>
+      </p:grpSpPr>
+      <p:sp>
+        <p:nvSpPr>
+          <p:cNvPr id="2" name="Slide Image Placeholder 1"/>
+          <p:cNvSpPr>
+            <a:spLocks noGrp="1" noRot="1" noChangeAspect="1"/>
+          </p:cNvSpPr>
+          <p:nvPr>
+            <p:ph type="sldImg"/>
+          </p:nvPr>
+        </p:nvSpPr>
+        <p:spPr/>
+      </p:sp>
+      <p:sp>
+        <p:nvSpPr>
+          <p:cNvPr id="3" name="Notes Placeholder 2"/>
+          <p:cNvSpPr>
+            <a:spLocks noGrp="1"/>
+          </p:cNvSpPr>
+          <p:nvPr>
+            <p:ph type="body" idx="1"/>
+          </p:nvPr>
+        </p:nvSpPr>
+        <p:spPr/>
+        <p:txBody>
+          <a:bodyPr/>
+          <a:lstStyle/>
+          <a:p>
+            <a:r>
+              <a:rPr lang="en-US" dirty="0" smtClean="0"/>
+              <a:t>In</a:t>
+            </a:r>
+            <a:r>
+              <a:rPr lang="en-US" baseline="0" dirty="0" smtClean="0"/>
+              <a:t> a real conversation, one person would respond differently based on what the other person says. A computer also has to respond to user input! Like when searching for something on Google, the results will change based on what the user enters.</a:t>
+            </a:r>
+            <a:endParaRPr lang="en-US" dirty="0"/>
+          </a:p>
+        </p:txBody>
+      </p:sp>
+      <p:sp>
+        <p:nvSpPr>
+          <p:cNvPr id="4" name="Slide Number Placeholder 3"/>
+          <p:cNvSpPr>
+            <a:spLocks noGrp="1"/>
+          </p:cNvSpPr>
+          <p:nvPr>
+            <p:ph type="sldNum" sz="quarter" idx="10"/>
+          </p:nvPr>
+        </p:nvSpPr>
+        <p:spPr/>
+        <p:txBody>
+          <a:bodyPr/>
+          <a:lstStyle/>
+          <a:p>
+            <a:fld id="{DEC8F7F9-57EC-49CF-9FCD-2B781E4B449F}" type="slidenum">
+              <a:rPr lang="en-US" smtClean="0"/>
+              <a:t>17</a:t>
+            </a:fld>
+            <a:endParaRPr lang="en-US"/>
+          </a:p>
+        </p:txBody>
+      </p:sp>
+    </p:spTree>
+    <p:extLst>
+      <p:ext uri="{BB962C8B-B14F-4D97-AF65-F5344CB8AC3E}">
+        <p14:creationId xmlns:p14="http://schemas.microsoft.com/office/powerpoint/2010/main" val="1865151885"/>
+      </p:ext>
+    </p:extLst>
+  </p:cSld>
+  <p:clrMapOvr>
+    <a:masterClrMapping/>
+  </p:clrMapOvr>
+</p:notes>
+</file>
+
+<file path=ppt/notesSlides/notesSlide15.xml><?xml version="1.0" encoding="utf-8"?>
+<p:notes xmlns:a="http://schemas.openxmlformats.org/drawingml/2006/main" xmlns:r="http://schemas.openxmlformats.org/officeDocument/2006/relationships" xmlns:p="http://schemas.openxmlformats.org/presentationml/2006/main">
+  <p:cSld>
+    <p:spTree>
+      <p:nvGrpSpPr>
+        <p:cNvPr id="1" name=""/>
+        <p:cNvGrpSpPr/>
+        <p:nvPr/>
+      </p:nvGrpSpPr>
+      <p:grpSpPr>
+        <a:xfrm>
+          <a:off x="0" y="0"/>
+          <a:ext cx="0" cy="0"/>
+          <a:chOff x="0" y="0"/>
+          <a:chExt cx="0" cy="0"/>
+        </a:xfrm>
+      </p:grpSpPr>
+      <p:sp>
+        <p:nvSpPr>
+          <p:cNvPr id="2" name="Slide Image Placeholder 1"/>
+          <p:cNvSpPr>
+            <a:spLocks noGrp="1" noRot="1" noChangeAspect="1"/>
+          </p:cNvSpPr>
+          <p:nvPr>
+            <p:ph type="sldImg"/>
+          </p:nvPr>
+        </p:nvSpPr>
+        <p:spPr/>
+      </p:sp>
+      <p:sp>
+        <p:nvSpPr>
+          <p:cNvPr id="3" name="Notes Placeholder 2"/>
+          <p:cNvSpPr>
+            <a:spLocks noGrp="1"/>
+          </p:cNvSpPr>
+          <p:nvPr>
+            <p:ph type="body" idx="1"/>
+          </p:nvPr>
+        </p:nvSpPr>
+        <p:spPr/>
+        <p:txBody>
+          <a:bodyPr/>
+          <a:lstStyle/>
+          <a:p>
+            <a:r>
+              <a:rPr lang="en-US" dirty="0" smtClean="0"/>
+              <a:t>What will happen if the user enters blue? What will happen if the user</a:t>
+            </a:r>
+            <a:r>
+              <a:rPr lang="en-US" baseline="0" dirty="0" smtClean="0"/>
+              <a:t> enters something other than blue? Explain that this is the same as the example from a real-life conversation.</a:t>
+            </a:r>
+          </a:p>
+          <a:p>
+            <a:endParaRPr lang="en-US" baseline="0" dirty="0" smtClean="0"/>
+          </a:p>
+          <a:p>
+            <a:r>
+              <a:rPr lang="en-US" b="1" baseline="0" dirty="0" smtClean="0"/>
+              <a:t>Indentation</a:t>
+            </a:r>
+            <a:r>
+              <a:rPr lang="en-US" b="0" i="0" baseline="0" dirty="0" smtClean="0"/>
+              <a:t> tells the program what to do </a:t>
+            </a:r>
+            <a:r>
+              <a:rPr lang="en-US" b="0" i="1" baseline="0" dirty="0" smtClean="0"/>
+              <a:t>if</a:t>
+            </a:r>
+            <a:r>
+              <a:rPr lang="en-US" b="0" i="0" baseline="0" dirty="0" smtClean="0"/>
+              <a:t> the condition is met. </a:t>
+            </a:r>
+            <a:endParaRPr lang="en-US" b="1" dirty="0"/>
+          </a:p>
+        </p:txBody>
+      </p:sp>
+      <p:sp>
+        <p:nvSpPr>
+          <p:cNvPr id="4" name="Slide Number Placeholder 3"/>
+          <p:cNvSpPr>
+            <a:spLocks noGrp="1"/>
+          </p:cNvSpPr>
+          <p:nvPr>
+            <p:ph type="sldNum" sz="quarter" idx="10"/>
+          </p:nvPr>
+        </p:nvSpPr>
+        <p:spPr/>
+        <p:txBody>
+          <a:bodyPr/>
+          <a:lstStyle/>
+          <a:p>
+            <a:fld id="{DEC8F7F9-57EC-49CF-9FCD-2B781E4B449F}" type="slidenum">
+              <a:rPr lang="en-US" smtClean="0"/>
+              <a:t>18</a:t>
+            </a:fld>
+            <a:endParaRPr lang="en-US"/>
+          </a:p>
+        </p:txBody>
+      </p:sp>
+    </p:spTree>
+    <p:extLst>
+      <p:ext uri="{BB962C8B-B14F-4D97-AF65-F5344CB8AC3E}">
+        <p14:creationId xmlns:p14="http://schemas.microsoft.com/office/powerpoint/2010/main" val="2337393084"/>
+      </p:ext>
+    </p:extLst>
+  </p:cSld>
+  <p:clrMapOvr>
+    <a:masterClrMapping/>
+  </p:clrMapOvr>
+</p:notes>
+</file>
+
+<file path=ppt/notesSlides/notesSlide16.xml><?xml version="1.0" encoding="utf-8"?>
+<p:notes xmlns:a="http://schemas.openxmlformats.org/drawingml/2006/main" xmlns:r="http://schemas.openxmlformats.org/officeDocument/2006/relationships" xmlns:p="http://schemas.openxmlformats.org/presentationml/2006/main">
+  <p:cSld>
+    <p:spTree>
+      <p:nvGrpSpPr>
+        <p:cNvPr id="1" name=""/>
+        <p:cNvGrpSpPr/>
+        <p:nvPr/>
+      </p:nvGrpSpPr>
+      <p:grpSpPr>
+        <a:xfrm>
+          <a:off x="0" y="0"/>
+          <a:ext cx="0" cy="0"/>
+          <a:chOff x="0" y="0"/>
+          <a:chExt cx="0" cy="0"/>
+        </a:xfrm>
+      </p:grpSpPr>
+      <p:sp>
+        <p:nvSpPr>
+          <p:cNvPr id="2" name="Slide Image Placeholder 1"/>
+          <p:cNvSpPr>
+            <a:spLocks noGrp="1" noRot="1" noChangeAspect="1"/>
+          </p:cNvSpPr>
+          <p:nvPr>
+            <p:ph type="sldImg"/>
+          </p:nvPr>
+        </p:nvSpPr>
+        <p:spPr/>
+      </p:sp>
+      <p:sp>
+        <p:nvSpPr>
+          <p:cNvPr id="3" name="Notes Placeholder 2"/>
+          <p:cNvSpPr>
+            <a:spLocks noGrp="1"/>
+          </p:cNvSpPr>
+          <p:nvPr>
+            <p:ph type="body" idx="1"/>
+          </p:nvPr>
+        </p:nvSpPr>
+        <p:spPr/>
+        <p:txBody>
+          <a:bodyPr/>
+          <a:lstStyle/>
+          <a:p>
+            <a:r>
+              <a:rPr lang="en-US" dirty="0" smtClean="0"/>
+              <a:t>Walk through the example</a:t>
+            </a:r>
+            <a:r>
+              <a:rPr lang="en-US" baseline="0" dirty="0" smtClean="0"/>
+              <a:t> line by line. Emphasize the need for indentation under the </a:t>
+            </a:r>
+            <a:r>
+              <a:rPr lang="en-US" b="1" baseline="0" dirty="0" smtClean="0"/>
+              <a:t>if</a:t>
+            </a:r>
+            <a:r>
+              <a:rPr lang="en-US" b="0" baseline="0" dirty="0" smtClean="0"/>
+              <a:t>.</a:t>
+            </a:r>
+            <a:endParaRPr lang="en-US" b="0" dirty="0"/>
+          </a:p>
+        </p:txBody>
+      </p:sp>
+      <p:sp>
+        <p:nvSpPr>
+          <p:cNvPr id="4" name="Slide Number Placeholder 3"/>
+          <p:cNvSpPr>
+            <a:spLocks noGrp="1"/>
+          </p:cNvSpPr>
+          <p:nvPr>
+            <p:ph type="sldNum" sz="quarter" idx="10"/>
+          </p:nvPr>
+        </p:nvSpPr>
+        <p:spPr/>
+        <p:txBody>
+          <a:bodyPr/>
+          <a:lstStyle/>
+          <a:p>
+            <a:fld id="{DEC8F7F9-57EC-49CF-9FCD-2B781E4B449F}" type="slidenum">
+              <a:rPr lang="en-US" smtClean="0"/>
+              <a:t>19</a:t>
+            </a:fld>
+            <a:endParaRPr lang="en-US"/>
+          </a:p>
+        </p:txBody>
+      </p:sp>
+    </p:spTree>
+    <p:extLst>
+      <p:ext uri="{BB962C8B-B14F-4D97-AF65-F5344CB8AC3E}">
+        <p14:creationId xmlns:p14="http://schemas.microsoft.com/office/powerpoint/2010/main" val="874223267"/>
+      </p:ext>
+    </p:extLst>
+  </p:cSld>
+  <p:clrMapOvr>
+    <a:masterClrMapping/>
+  </p:clrMapOvr>
+</p:notes>
+</file>
+
+<file path=ppt/notesSlides/notesSlide17.xml><?xml version="1.0" encoding="utf-8"?>
+<p:notes xmlns:a="http://schemas.openxmlformats.org/drawingml/2006/main" xmlns:r="http://schemas.openxmlformats.org/officeDocument/2006/relationships" xmlns:p="http://schemas.openxmlformats.org/presentationml/2006/main">
+  <p:cSld>
+    <p:spTree>
+      <p:nvGrpSpPr>
+        <p:cNvPr id="1" name=""/>
+        <p:cNvGrpSpPr/>
+        <p:nvPr/>
+      </p:nvGrpSpPr>
+      <p:grpSpPr>
+        <a:xfrm>
+          <a:off x="0" y="0"/>
+          <a:ext cx="0" cy="0"/>
+          <a:chOff x="0" y="0"/>
+          <a:chExt cx="0" cy="0"/>
+        </a:xfrm>
+      </p:grpSpPr>
+      <p:sp>
+        <p:nvSpPr>
+          <p:cNvPr id="2" name="Slide Image Placeholder 1"/>
+          <p:cNvSpPr>
+            <a:spLocks noGrp="1" noRot="1" noChangeAspect="1"/>
+          </p:cNvSpPr>
+          <p:nvPr>
+            <p:ph type="sldImg"/>
+          </p:nvPr>
+        </p:nvSpPr>
+        <p:spPr/>
+      </p:sp>
+      <p:sp>
+        <p:nvSpPr>
+          <p:cNvPr id="3" name="Notes Placeholder 2"/>
+          <p:cNvSpPr>
+            <a:spLocks noGrp="1"/>
+          </p:cNvSpPr>
+          <p:nvPr>
+            <p:ph type="body" idx="1"/>
+          </p:nvPr>
+        </p:nvSpPr>
+        <p:spPr/>
+        <p:txBody>
+          <a:bodyPr/>
+          <a:lstStyle/>
+          <a:p>
+            <a:r>
+              <a:rPr lang="en-US" dirty="0" smtClean="0"/>
+              <a:t>Explain</a:t>
+            </a:r>
+            <a:r>
+              <a:rPr lang="en-US" baseline="0" dirty="0" smtClean="0"/>
+              <a:t> the distinction between single equals and double equals. This syntax can sometimes trip students up. They should remember, if they are using an </a:t>
+            </a:r>
+            <a:r>
+              <a:rPr lang="en-US" b="1" baseline="0" dirty="0" smtClean="0"/>
+              <a:t>if</a:t>
+            </a:r>
+            <a:r>
+              <a:rPr lang="en-US" b="0" baseline="0" dirty="0" smtClean="0"/>
+              <a:t>, they should use </a:t>
+            </a:r>
+            <a:r>
+              <a:rPr lang="en-US" b="0" i="1" baseline="0" dirty="0" smtClean="0"/>
+              <a:t>two</a:t>
+            </a:r>
+            <a:r>
+              <a:rPr lang="en-US" b="0" baseline="0" dirty="0" smtClean="0"/>
+              <a:t> equals signs. If they are setting a variable or looking for user input, they should use </a:t>
+            </a:r>
+            <a:r>
+              <a:rPr lang="en-US" b="0" i="1" baseline="0" dirty="0" smtClean="0"/>
+              <a:t>one</a:t>
+            </a:r>
+            <a:r>
+              <a:rPr lang="en-US" b="0" baseline="0" dirty="0" smtClean="0"/>
+              <a:t> equals sign.</a:t>
+            </a:r>
+            <a:endParaRPr lang="en-US" dirty="0"/>
+          </a:p>
+        </p:txBody>
+      </p:sp>
+      <p:sp>
+        <p:nvSpPr>
+          <p:cNvPr id="4" name="Slide Number Placeholder 3"/>
+          <p:cNvSpPr>
+            <a:spLocks noGrp="1"/>
+          </p:cNvSpPr>
+          <p:nvPr>
+            <p:ph type="sldNum" sz="quarter" idx="10"/>
+          </p:nvPr>
+        </p:nvSpPr>
+        <p:spPr/>
+        <p:txBody>
+          <a:bodyPr/>
+          <a:lstStyle/>
+          <a:p>
+            <a:fld id="{DEC8F7F9-57EC-49CF-9FCD-2B781E4B449F}" type="slidenum">
+              <a:rPr lang="en-US" smtClean="0"/>
+              <a:t>20</a:t>
+            </a:fld>
+            <a:endParaRPr lang="en-US"/>
+          </a:p>
+        </p:txBody>
+      </p:sp>
+    </p:spTree>
+    <p:extLst>
+      <p:ext uri="{BB962C8B-B14F-4D97-AF65-F5344CB8AC3E}">
+        <p14:creationId xmlns:p14="http://schemas.microsoft.com/office/powerpoint/2010/main" val="1652787256"/>
+      </p:ext>
+    </p:extLst>
+  </p:cSld>
+  <p:clrMapOvr>
+    <a:masterClrMapping/>
+  </p:clrMapOvr>
+</p:notes>
+</file>
+
+<file path=ppt/notesSlides/notesSlide18.xml><?xml version="1.0" encoding="utf-8"?>
+<p:notes xmlns:a="http://schemas.openxmlformats.org/drawingml/2006/main" xmlns:r="http://schemas.openxmlformats.org/officeDocument/2006/relationships" xmlns:p="http://schemas.openxmlformats.org/presentationml/2006/main">
+  <p:cSld>
+    <p:spTree>
+      <p:nvGrpSpPr>
+        <p:cNvPr id="1" name=""/>
+        <p:cNvGrpSpPr/>
+        <p:nvPr/>
+      </p:nvGrpSpPr>
+      <p:grpSpPr>
+        <a:xfrm>
+          <a:off x="0" y="0"/>
+          <a:ext cx="0" cy="0"/>
+          <a:chOff x="0" y="0"/>
+          <a:chExt cx="0" cy="0"/>
+        </a:xfrm>
+      </p:grpSpPr>
+      <p:sp>
+        <p:nvSpPr>
+          <p:cNvPr id="2" name="Slide Image Placeholder 1"/>
+          <p:cNvSpPr>
+            <a:spLocks noGrp="1" noRot="1" noChangeAspect="1"/>
+          </p:cNvSpPr>
+          <p:nvPr>
+            <p:ph type="sldImg"/>
+          </p:nvPr>
+        </p:nvSpPr>
+        <p:spPr/>
+      </p:sp>
+      <p:sp>
+        <p:nvSpPr>
+          <p:cNvPr id="3" name="Notes Placeholder 2"/>
+          <p:cNvSpPr>
+            <a:spLocks noGrp="1"/>
+          </p:cNvSpPr>
+          <p:nvPr>
+            <p:ph type="body" idx="1"/>
+          </p:nvPr>
+        </p:nvSpPr>
+        <p:spPr/>
+        <p:txBody>
+          <a:bodyPr/>
+          <a:lstStyle/>
+          <a:p>
+            <a:r>
+              <a:rPr lang="en-US" dirty="0" smtClean="0"/>
+              <a:t>See if the students can guess what this code</a:t>
+            </a:r>
+            <a:r>
+              <a:rPr lang="en-US" baseline="0" dirty="0" smtClean="0"/>
+              <a:t> will do. </a:t>
+            </a:r>
+            <a:r>
+              <a:rPr lang="en-US" b="1" baseline="0" dirty="0" smtClean="0"/>
+              <a:t>else</a:t>
+            </a:r>
+            <a:r>
+              <a:rPr lang="en-US" b="0" baseline="0" dirty="0" smtClean="0"/>
+              <a:t> allows different code to execute if a condition is not true.</a:t>
+            </a:r>
+            <a:endParaRPr lang="en-US" dirty="0"/>
+          </a:p>
+        </p:txBody>
+      </p:sp>
+      <p:sp>
+        <p:nvSpPr>
+          <p:cNvPr id="4" name="Slide Number Placeholder 3"/>
+          <p:cNvSpPr>
+            <a:spLocks noGrp="1"/>
+          </p:cNvSpPr>
+          <p:nvPr>
+            <p:ph type="sldNum" sz="quarter" idx="10"/>
+          </p:nvPr>
+        </p:nvSpPr>
+        <p:spPr/>
+        <p:txBody>
+          <a:bodyPr/>
+          <a:lstStyle/>
+          <a:p>
+            <a:fld id="{DEC8F7F9-57EC-49CF-9FCD-2B781E4B449F}" type="slidenum">
+              <a:rPr lang="en-US" smtClean="0"/>
+              <a:t>21</a:t>
+            </a:fld>
+            <a:endParaRPr lang="en-US"/>
+          </a:p>
+        </p:txBody>
+      </p:sp>
+    </p:spTree>
+    <p:extLst>
+      <p:ext uri="{BB962C8B-B14F-4D97-AF65-F5344CB8AC3E}">
+        <p14:creationId xmlns:p14="http://schemas.microsoft.com/office/powerpoint/2010/main" val="3521182454"/>
+      </p:ext>
+    </p:extLst>
+  </p:cSld>
+  <p:clrMapOvr>
+    <a:masterClrMapping/>
+  </p:clrMapOvr>
+</p:notes>
+</file>
+
+<file path=ppt/notesSlides/notesSlide19.xml><?xml version="1.0" encoding="utf-8"?>
+<p:notes xmlns:a="http://schemas.openxmlformats.org/drawingml/2006/main" xmlns:r="http://schemas.openxmlformats.org/officeDocument/2006/relationships" xmlns:p="http://schemas.openxmlformats.org/presentationml/2006/main">
+  <p:cSld>
+    <p:spTree>
+      <p:nvGrpSpPr>
+        <p:cNvPr id="1" name=""/>
+        <p:cNvGrpSpPr/>
+        <p:nvPr/>
+      </p:nvGrpSpPr>
+      <p:grpSpPr>
+        <a:xfrm>
+          <a:off x="0" y="0"/>
+          <a:ext cx="0" cy="0"/>
+          <a:chOff x="0" y="0"/>
+          <a:chExt cx="0" cy="0"/>
+        </a:xfrm>
+      </p:grpSpPr>
+      <p:sp>
+        <p:nvSpPr>
+          <p:cNvPr id="2" name="Slide Image Placeholder 1"/>
+          <p:cNvSpPr>
+            <a:spLocks noGrp="1" noRot="1" noChangeAspect="1"/>
+          </p:cNvSpPr>
+          <p:nvPr>
+            <p:ph type="sldImg"/>
+          </p:nvPr>
+        </p:nvSpPr>
+        <p:spPr/>
+      </p:sp>
+      <p:sp>
+        <p:nvSpPr>
+          <p:cNvPr id="3" name="Notes Placeholder 2"/>
+          <p:cNvSpPr>
+            <a:spLocks noGrp="1"/>
+          </p:cNvSpPr>
+          <p:nvPr>
+            <p:ph type="body" idx="1"/>
+          </p:nvPr>
+        </p:nvSpPr>
+        <p:spPr/>
+        <p:txBody>
+          <a:bodyPr/>
+          <a:lstStyle/>
+          <a:p>
+            <a:r>
+              <a:rPr lang="en-US" dirty="0" smtClean="0"/>
+              <a:t>This slide is</a:t>
+            </a:r>
+            <a:r>
+              <a:rPr lang="en-US" baseline="0" dirty="0" smtClean="0"/>
+              <a:t> mostly for informational purposes, and the students will likely be distracted by the looping gif, so it is not necessary to stay very long on this slide.</a:t>
+            </a:r>
+          </a:p>
+          <a:p>
+            <a:endParaRPr lang="en-US" baseline="0" dirty="0" smtClean="0"/>
+          </a:p>
+          <a:p>
+            <a:r>
+              <a:rPr lang="en-US" baseline="0" dirty="0" smtClean="0"/>
+              <a:t>Explain loops in the context of the image; rather than having to hand-animate every single repeated frame, the gif will loop forever, which is much easier!</a:t>
+            </a:r>
+            <a:endParaRPr lang="en-US" dirty="0"/>
+          </a:p>
+        </p:txBody>
+      </p:sp>
+      <p:sp>
+        <p:nvSpPr>
+          <p:cNvPr id="4" name="Slide Number Placeholder 3"/>
+          <p:cNvSpPr>
+            <a:spLocks noGrp="1"/>
+          </p:cNvSpPr>
+          <p:nvPr>
+            <p:ph type="sldNum" sz="quarter" idx="10"/>
+          </p:nvPr>
+        </p:nvSpPr>
+        <p:spPr/>
+        <p:txBody>
+          <a:bodyPr/>
+          <a:lstStyle/>
+          <a:p>
+            <a:fld id="{DEC8F7F9-57EC-49CF-9FCD-2B781E4B449F}" type="slidenum">
+              <a:rPr lang="en-US" smtClean="0"/>
+              <a:t>22</a:t>
+            </a:fld>
+            <a:endParaRPr lang="en-US"/>
+          </a:p>
+        </p:txBody>
+      </p:sp>
+    </p:spTree>
+    <p:extLst>
+      <p:ext uri="{BB962C8B-B14F-4D97-AF65-F5344CB8AC3E}">
+        <p14:creationId xmlns:p14="http://schemas.microsoft.com/office/powerpoint/2010/main" val="2995987653"/>
       </p:ext>
     </p:extLst>
   </p:cSld>
@@ -984,7 +1679,19 @@
           <a:p>
             <a:r>
               <a:rPr lang="en-US" dirty="0" smtClean="0"/>
-              <a:t>Direct the students to trinket, and have them follow along with the presentation</a:t>
+              <a:t>Ask</a:t>
+            </a:r>
+            <a:r>
+              <a:rPr lang="en-US" baseline="0" dirty="0" smtClean="0"/>
+              <a:t> students if they know anything about Python or programming. Ask them to guess how Python got its name. Ask them if they know what a </a:t>
+            </a:r>
+            <a:r>
+              <a:rPr lang="en-US" i="1" baseline="0" dirty="0" smtClean="0"/>
+              <a:t>general-purpose</a:t>
+            </a:r>
+            <a:r>
+              <a:rPr lang="en-US" i="0" baseline="0" dirty="0" smtClean="0"/>
+              <a:t> language is.</a:t>
             </a:r>
             <a:endParaRPr lang="en-US" dirty="0"/>
           </a:p>
@@ -1007,7 +1714,7 @@
           <a:p>
             <a:fld id="{DEC8F7F9-57EC-49CF-9FCD-2B781E4B449F}" type="slidenum">
               <a:rPr lang="en-US" smtClean="0"/>
-              <a:t>6</a:t>
+              <a:t>5</a:t>
             </a:fld>
             <a:endParaRPr lang="en-US"/>
           </a:p>
@@ -1016,7 +1723,549 @@
     </p:spTree>
     <p:extLst>
       <p:ext uri="{BB962C8B-B14F-4D97-AF65-F5344CB8AC3E}">
-        <p14:creationId xmlns:p14="http://schemas.microsoft.com/office/powerpoint/2010/main" val="670394549"/>
+        <p14:creationId xmlns:p14="http://schemas.microsoft.com/office/powerpoint/2010/main" val="2340305351"/>
+      </p:ext>
+    </p:extLst>
+  </p:cSld>
+  <p:clrMapOvr>
+    <a:masterClrMapping/>
+  </p:clrMapOvr>
+</p:notes>
+</file>
+
+<file path=ppt/notesSlides/notesSlide20.xml><?xml version="1.0" encoding="utf-8"?>
+<p:notes xmlns:a="http://schemas.openxmlformats.org/drawingml/2006/main" xmlns:r="http://schemas.openxmlformats.org/officeDocument/2006/relationships" xmlns:p="http://schemas.openxmlformats.org/presentationml/2006/main">
+  <p:cSld>
+    <p:spTree>
+      <p:nvGrpSpPr>
+        <p:cNvPr id="1" name=""/>
+        <p:cNvGrpSpPr/>
+        <p:nvPr/>
+      </p:nvGrpSpPr>
+      <p:grpSpPr>
+        <a:xfrm>
+          <a:off x="0" y="0"/>
+          <a:ext cx="0" cy="0"/>
+          <a:chOff x="0" y="0"/>
+          <a:chExt cx="0" cy="0"/>
+        </a:xfrm>
+      </p:grpSpPr>
+      <p:sp>
+        <p:nvSpPr>
+          <p:cNvPr id="2" name="Slide Image Placeholder 1"/>
+          <p:cNvSpPr>
+            <a:spLocks noGrp="1" noRot="1" noChangeAspect="1"/>
+          </p:cNvSpPr>
+          <p:nvPr>
+            <p:ph type="sldImg"/>
+          </p:nvPr>
+        </p:nvSpPr>
+        <p:spPr/>
+      </p:sp>
+      <p:sp>
+        <p:nvSpPr>
+          <p:cNvPr id="3" name="Notes Placeholder 2"/>
+          <p:cNvSpPr>
+            <a:spLocks noGrp="1"/>
+          </p:cNvSpPr>
+          <p:nvPr>
+            <p:ph type="body" idx="1"/>
+          </p:nvPr>
+        </p:nvSpPr>
+        <p:spPr/>
+        <p:txBody>
+          <a:bodyPr/>
+          <a:lstStyle/>
+          <a:p>
+            <a:r>
+              <a:rPr lang="en-US" dirty="0" smtClean="0"/>
+              <a:t>See</a:t>
+            </a:r>
+            <a:r>
+              <a:rPr lang="en-US" baseline="0" dirty="0" smtClean="0"/>
+              <a:t> if the students can figure out what this code does. The </a:t>
+            </a:r>
+            <a:r>
+              <a:rPr lang="en-US" b="1" baseline="0" dirty="0" smtClean="0"/>
+              <a:t>for</a:t>
+            </a:r>
+            <a:r>
+              <a:rPr lang="en-US" b="0" baseline="0" dirty="0" smtClean="0"/>
+              <a:t> loop syntax is not incredibly important, as it will be the same every time (other than the number of iterations). Allow the students to type this code into trinket to see what it does.</a:t>
+            </a:r>
+            <a:endParaRPr lang="en-US" dirty="0"/>
+          </a:p>
+        </p:txBody>
+      </p:sp>
+      <p:sp>
+        <p:nvSpPr>
+          <p:cNvPr id="4" name="Slide Number Placeholder 3"/>
+          <p:cNvSpPr>
+            <a:spLocks noGrp="1"/>
+          </p:cNvSpPr>
+          <p:nvPr>
+            <p:ph type="sldNum" sz="quarter" idx="10"/>
+          </p:nvPr>
+        </p:nvSpPr>
+        <p:spPr/>
+        <p:txBody>
+          <a:bodyPr/>
+          <a:lstStyle/>
+          <a:p>
+            <a:fld id="{DEC8F7F9-57EC-49CF-9FCD-2B781E4B449F}" type="slidenum">
+              <a:rPr lang="en-US" smtClean="0"/>
+              <a:t>23</a:t>
+            </a:fld>
+            <a:endParaRPr lang="en-US"/>
+          </a:p>
+        </p:txBody>
+      </p:sp>
+    </p:spTree>
+    <p:extLst>
+      <p:ext uri="{BB962C8B-B14F-4D97-AF65-F5344CB8AC3E}">
+        <p14:creationId xmlns:p14="http://schemas.microsoft.com/office/powerpoint/2010/main" val="3921428091"/>
+      </p:ext>
+    </p:extLst>
+  </p:cSld>
+  <p:clrMapOvr>
+    <a:masterClrMapping/>
+  </p:clrMapOvr>
+</p:notes>
+</file>
+
+<file path=ppt/notesSlides/notesSlide21.xml><?xml version="1.0" encoding="utf-8"?>
+<p:notes xmlns:a="http://schemas.openxmlformats.org/drawingml/2006/main" xmlns:r="http://schemas.openxmlformats.org/officeDocument/2006/relationships" xmlns:p="http://schemas.openxmlformats.org/presentationml/2006/main">
+  <p:cSld>
+    <p:spTree>
+      <p:nvGrpSpPr>
+        <p:cNvPr id="1" name=""/>
+        <p:cNvGrpSpPr/>
+        <p:nvPr/>
+      </p:nvGrpSpPr>
+      <p:grpSpPr>
+        <a:xfrm>
+          <a:off x="0" y="0"/>
+          <a:ext cx="0" cy="0"/>
+          <a:chOff x="0" y="0"/>
+          <a:chExt cx="0" cy="0"/>
+        </a:xfrm>
+      </p:grpSpPr>
+      <p:sp>
+        <p:nvSpPr>
+          <p:cNvPr id="2" name="Slide Image Placeholder 1"/>
+          <p:cNvSpPr>
+            <a:spLocks noGrp="1" noRot="1" noChangeAspect="1"/>
+          </p:cNvSpPr>
+          <p:nvPr>
+            <p:ph type="sldImg"/>
+          </p:nvPr>
+        </p:nvSpPr>
+        <p:spPr/>
+      </p:sp>
+      <p:sp>
+        <p:nvSpPr>
+          <p:cNvPr id="3" name="Notes Placeholder 2"/>
+          <p:cNvSpPr>
+            <a:spLocks noGrp="1"/>
+          </p:cNvSpPr>
+          <p:nvPr>
+            <p:ph type="body" idx="1"/>
+          </p:nvPr>
+        </p:nvSpPr>
+        <p:spPr/>
+        <p:txBody>
+          <a:bodyPr/>
+          <a:lstStyle/>
+          <a:p>
+            <a:r>
+              <a:rPr lang="en-US" dirty="0" smtClean="0"/>
+              <a:t>Explain what the</a:t>
+            </a:r>
+            <a:r>
+              <a:rPr lang="en-US" baseline="0" dirty="0" smtClean="0"/>
+              <a:t> example code does. Emphasize the need for indentation.</a:t>
+            </a:r>
+          </a:p>
+          <a:p>
+            <a:endParaRPr lang="en-US" baseline="0" dirty="0" smtClean="0"/>
+          </a:p>
+          <a:p>
+            <a:r>
+              <a:rPr lang="en-US" baseline="0" dirty="0" smtClean="0"/>
+              <a:t>Printing a message is simple enough; it just prints the message to the screen.</a:t>
+            </a:r>
+          </a:p>
+          <a:p>
+            <a:endParaRPr lang="en-US" baseline="0" dirty="0" smtClean="0"/>
+          </a:p>
+          <a:p>
+            <a:r>
+              <a:rPr lang="en-US" baseline="0" dirty="0" smtClean="0"/>
+              <a:t>The </a:t>
+            </a:r>
+            <a:r>
+              <a:rPr lang="en-US" b="1" baseline="0" dirty="0" smtClean="0"/>
+              <a:t>print</a:t>
+            </a:r>
+            <a:r>
+              <a:rPr lang="en-US" b="0" baseline="0" dirty="0" smtClean="0"/>
+              <a:t> code is within the </a:t>
+            </a:r>
+            <a:r>
+              <a:rPr lang="en-US" b="1" baseline="0" dirty="0" smtClean="0"/>
+              <a:t>for</a:t>
+            </a:r>
+            <a:r>
+              <a:rPr lang="en-US" b="0" baseline="0" dirty="0" smtClean="0"/>
+              <a:t> code (under it, and </a:t>
+            </a:r>
+            <a:r>
+              <a:rPr lang="en-US" b="0" baseline="0" dirty="0" smtClean="0"/>
+              <a:t>indented). The </a:t>
+            </a:r>
+            <a:r>
+              <a:rPr lang="en-US" b="1" baseline="0" dirty="0" smtClean="0"/>
+              <a:t>for x in range():</a:t>
+            </a:r>
+            <a:r>
+              <a:rPr lang="en-US" b="0" baseline="0" dirty="0" smtClean="0"/>
+              <a:t> will always be the same for them, the only thing they’ll change is the number.</a:t>
+            </a:r>
+            <a:endParaRPr lang="en-US" dirty="0"/>
+          </a:p>
+        </p:txBody>
+      </p:sp>
+      <p:sp>
+        <p:nvSpPr>
+          <p:cNvPr id="4" name="Slide Number Placeholder 3"/>
+          <p:cNvSpPr>
+            <a:spLocks noGrp="1"/>
+          </p:cNvSpPr>
+          <p:nvPr>
+            <p:ph type="sldNum" sz="quarter" idx="10"/>
+          </p:nvPr>
+        </p:nvSpPr>
+        <p:spPr/>
+        <p:txBody>
+          <a:bodyPr/>
+          <a:lstStyle/>
+          <a:p>
+            <a:fld id="{DEC8F7F9-57EC-49CF-9FCD-2B781E4B449F}" type="slidenum">
+              <a:rPr lang="en-US" smtClean="0"/>
+              <a:t>24</a:t>
+            </a:fld>
+            <a:endParaRPr lang="en-US"/>
+          </a:p>
+        </p:txBody>
+      </p:sp>
+    </p:spTree>
+    <p:extLst>
+      <p:ext uri="{BB962C8B-B14F-4D97-AF65-F5344CB8AC3E}">
+        <p14:creationId xmlns:p14="http://schemas.microsoft.com/office/powerpoint/2010/main" val="3310518321"/>
+      </p:ext>
+    </p:extLst>
+  </p:cSld>
+  <p:clrMapOvr>
+    <a:masterClrMapping/>
+  </p:clrMapOvr>
+</p:notes>
+</file>
+
+<file path=ppt/notesSlides/notesSlide22.xml><?xml version="1.0" encoding="utf-8"?>
+<p:notes xmlns:a="http://schemas.openxmlformats.org/drawingml/2006/main" xmlns:r="http://schemas.openxmlformats.org/officeDocument/2006/relationships" xmlns:p="http://schemas.openxmlformats.org/presentationml/2006/main">
+  <p:cSld>
+    <p:spTree>
+      <p:nvGrpSpPr>
+        <p:cNvPr id="1" name=""/>
+        <p:cNvGrpSpPr/>
+        <p:nvPr/>
+      </p:nvGrpSpPr>
+      <p:grpSpPr>
+        <a:xfrm>
+          <a:off x="0" y="0"/>
+          <a:ext cx="0" cy="0"/>
+          <a:chOff x="0" y="0"/>
+          <a:chExt cx="0" cy="0"/>
+        </a:xfrm>
+      </p:grpSpPr>
+      <p:sp>
+        <p:nvSpPr>
+          <p:cNvPr id="2" name="Slide Image Placeholder 1"/>
+          <p:cNvSpPr>
+            <a:spLocks noGrp="1" noRot="1" noChangeAspect="1"/>
+          </p:cNvSpPr>
+          <p:nvPr>
+            <p:ph type="sldImg"/>
+          </p:nvPr>
+        </p:nvSpPr>
+        <p:spPr/>
+      </p:sp>
+      <p:sp>
+        <p:nvSpPr>
+          <p:cNvPr id="3" name="Notes Placeholder 2"/>
+          <p:cNvSpPr>
+            <a:spLocks noGrp="1"/>
+          </p:cNvSpPr>
+          <p:nvPr>
+            <p:ph type="body" idx="1"/>
+          </p:nvPr>
+        </p:nvSpPr>
+        <p:spPr/>
+        <p:txBody>
+          <a:bodyPr/>
+          <a:lstStyle/>
+          <a:p>
+            <a:r>
+              <a:rPr lang="en-US" dirty="0" smtClean="0"/>
+              <a:t>Give students the opportunity</a:t>
+            </a:r>
+            <a:r>
+              <a:rPr lang="en-US" baseline="0" dirty="0" smtClean="0"/>
+              <a:t> to try and change the code so it prints more messages. All they have to do is change </a:t>
+            </a:r>
+            <a:r>
+              <a:rPr lang="en-US" b="1" baseline="0" dirty="0" smtClean="0"/>
+              <a:t>10</a:t>
+            </a:r>
+            <a:r>
+              <a:rPr lang="en-US" b="0" baseline="0" dirty="0" smtClean="0"/>
+              <a:t> to </a:t>
+            </a:r>
+            <a:r>
+              <a:rPr lang="en-US" b="1" baseline="0" dirty="0" smtClean="0"/>
+              <a:t>20</a:t>
+            </a:r>
+            <a:r>
+              <a:rPr lang="en-US" b="0" baseline="0" dirty="0" smtClean="0"/>
+              <a:t> (or another number higher than 10) so it prints more.</a:t>
+            </a:r>
+            <a:endParaRPr lang="en-US" dirty="0"/>
+          </a:p>
+        </p:txBody>
+      </p:sp>
+      <p:sp>
+        <p:nvSpPr>
+          <p:cNvPr id="4" name="Slide Number Placeholder 3"/>
+          <p:cNvSpPr>
+            <a:spLocks noGrp="1"/>
+          </p:cNvSpPr>
+          <p:nvPr>
+            <p:ph type="sldNum" sz="quarter" idx="10"/>
+          </p:nvPr>
+        </p:nvSpPr>
+        <p:spPr/>
+        <p:txBody>
+          <a:bodyPr/>
+          <a:lstStyle/>
+          <a:p>
+            <a:fld id="{DEC8F7F9-57EC-49CF-9FCD-2B781E4B449F}" type="slidenum">
+              <a:rPr lang="en-US" smtClean="0"/>
+              <a:t>25</a:t>
+            </a:fld>
+            <a:endParaRPr lang="en-US"/>
+          </a:p>
+        </p:txBody>
+      </p:sp>
+    </p:spTree>
+    <p:extLst>
+      <p:ext uri="{BB962C8B-B14F-4D97-AF65-F5344CB8AC3E}">
+        <p14:creationId xmlns:p14="http://schemas.microsoft.com/office/powerpoint/2010/main" val="1593956060"/>
+      </p:ext>
+    </p:extLst>
+  </p:cSld>
+  <p:clrMapOvr>
+    <a:masterClrMapping/>
+  </p:clrMapOvr>
+</p:notes>
+</file>
+
+<file path=ppt/notesSlides/notesSlide23.xml><?xml version="1.0" encoding="utf-8"?>
+<p:notes xmlns:a="http://schemas.openxmlformats.org/drawingml/2006/main" xmlns:r="http://schemas.openxmlformats.org/officeDocument/2006/relationships" xmlns:p="http://schemas.openxmlformats.org/presentationml/2006/main">
+  <p:cSld>
+    <p:spTree>
+      <p:nvGrpSpPr>
+        <p:cNvPr id="1" name=""/>
+        <p:cNvGrpSpPr/>
+        <p:nvPr/>
+      </p:nvGrpSpPr>
+      <p:grpSpPr>
+        <a:xfrm>
+          <a:off x="0" y="0"/>
+          <a:ext cx="0" cy="0"/>
+          <a:chOff x="0" y="0"/>
+          <a:chExt cx="0" cy="0"/>
+        </a:xfrm>
+      </p:grpSpPr>
+      <p:sp>
+        <p:nvSpPr>
+          <p:cNvPr id="2" name="Slide Image Placeholder 1"/>
+          <p:cNvSpPr>
+            <a:spLocks noGrp="1" noRot="1" noChangeAspect="1"/>
+          </p:cNvSpPr>
+          <p:nvPr>
+            <p:ph type="sldImg"/>
+          </p:nvPr>
+        </p:nvSpPr>
+        <p:spPr/>
+      </p:sp>
+      <p:sp>
+        <p:nvSpPr>
+          <p:cNvPr id="3" name="Notes Placeholder 2"/>
+          <p:cNvSpPr>
+            <a:spLocks noGrp="1"/>
+          </p:cNvSpPr>
+          <p:nvPr>
+            <p:ph type="body" idx="1"/>
+          </p:nvPr>
+        </p:nvSpPr>
+        <p:spPr/>
+        <p:txBody>
+          <a:bodyPr/>
+          <a:lstStyle/>
+          <a:p>
+            <a:r>
+              <a:rPr lang="en-US" dirty="0" smtClean="0"/>
+              <a:t>Click the</a:t>
+            </a:r>
+            <a:r>
+              <a:rPr lang="en-US" baseline="0" dirty="0" smtClean="0"/>
+              <a:t> link to start the </a:t>
+            </a:r>
+            <a:r>
+              <a:rPr lang="en-US" baseline="0" dirty="0" err="1" smtClean="0"/>
+              <a:t>Kahoot</a:t>
+            </a:r>
+            <a:r>
+              <a:rPr lang="en-US" baseline="0" dirty="0" smtClean="0"/>
+              <a:t> quiz</a:t>
+            </a:r>
+            <a:endParaRPr lang="en-US" dirty="0"/>
+          </a:p>
+        </p:txBody>
+      </p:sp>
+      <p:sp>
+        <p:nvSpPr>
+          <p:cNvPr id="4" name="Slide Number Placeholder 3"/>
+          <p:cNvSpPr>
+            <a:spLocks noGrp="1"/>
+          </p:cNvSpPr>
+          <p:nvPr>
+            <p:ph type="sldNum" sz="quarter" idx="10"/>
+          </p:nvPr>
+        </p:nvSpPr>
+        <p:spPr/>
+        <p:txBody>
+          <a:bodyPr/>
+          <a:lstStyle/>
+          <a:p>
+            <a:fld id="{DEC8F7F9-57EC-49CF-9FCD-2B781E4B449F}" type="slidenum">
+              <a:rPr lang="en-US" smtClean="0"/>
+              <a:t>26</a:t>
+            </a:fld>
+            <a:endParaRPr lang="en-US"/>
+          </a:p>
+        </p:txBody>
+      </p:sp>
+    </p:spTree>
+    <p:extLst>
+      <p:ext uri="{BB962C8B-B14F-4D97-AF65-F5344CB8AC3E}">
+        <p14:creationId xmlns:p14="http://schemas.microsoft.com/office/powerpoint/2010/main" val="3866903638"/>
+      </p:ext>
+    </p:extLst>
+  </p:cSld>
+  <p:clrMapOvr>
+    <a:masterClrMapping/>
+  </p:clrMapOvr>
+</p:notes>
+</file>
+
+<file path=ppt/notesSlides/notesSlide24.xml><?xml version="1.0" encoding="utf-8"?>
+<p:notes xmlns:a="http://schemas.openxmlformats.org/drawingml/2006/main" xmlns:r="http://schemas.openxmlformats.org/officeDocument/2006/relationships" xmlns:p="http://schemas.openxmlformats.org/presentationml/2006/main">
+  <p:cSld>
+    <p:spTree>
+      <p:nvGrpSpPr>
+        <p:cNvPr id="1" name=""/>
+        <p:cNvGrpSpPr/>
+        <p:nvPr/>
+      </p:nvGrpSpPr>
+      <p:grpSpPr>
+        <a:xfrm>
+          <a:off x="0" y="0"/>
+          <a:ext cx="0" cy="0"/>
+          <a:chOff x="0" y="0"/>
+          <a:chExt cx="0" cy="0"/>
+        </a:xfrm>
+      </p:grpSpPr>
+      <p:sp>
+        <p:nvSpPr>
+          <p:cNvPr id="2" name="Slide Image Placeholder 1"/>
+          <p:cNvSpPr>
+            <a:spLocks noGrp="1" noRot="1" noChangeAspect="1"/>
+          </p:cNvSpPr>
+          <p:nvPr>
+            <p:ph type="sldImg"/>
+          </p:nvPr>
+        </p:nvSpPr>
+        <p:spPr/>
+      </p:sp>
+      <p:sp>
+        <p:nvSpPr>
+          <p:cNvPr id="3" name="Notes Placeholder 2"/>
+          <p:cNvSpPr>
+            <a:spLocks noGrp="1"/>
+          </p:cNvSpPr>
+          <p:nvPr>
+            <p:ph type="body" idx="1"/>
+          </p:nvPr>
+        </p:nvSpPr>
+        <p:spPr/>
+        <p:txBody>
+          <a:bodyPr/>
+          <a:lstStyle/>
+          <a:p>
+            <a:r>
+              <a:rPr lang="en-US" dirty="0" smtClean="0"/>
+              <a:t>Direct the students to visit the</a:t>
+            </a:r>
+            <a:r>
+              <a:rPr lang="en-US" baseline="0" dirty="0" smtClean="0"/>
+              <a:t> URL. This will contain the instructions for </a:t>
+            </a:r>
+            <a:r>
+              <a:rPr lang="en-US" baseline="0" smtClean="0"/>
+              <a:t>the activities.</a:t>
+            </a:r>
+            <a:endParaRPr lang="en-US"/>
+          </a:p>
+        </p:txBody>
+      </p:sp>
+      <p:sp>
+        <p:nvSpPr>
+          <p:cNvPr id="4" name="Slide Number Placeholder 3"/>
+          <p:cNvSpPr>
+            <a:spLocks noGrp="1"/>
+          </p:cNvSpPr>
+          <p:nvPr>
+            <p:ph type="sldNum" sz="quarter" idx="10"/>
+          </p:nvPr>
+        </p:nvSpPr>
+        <p:spPr/>
+        <p:txBody>
+          <a:bodyPr/>
+          <a:lstStyle/>
+          <a:p>
+            <a:fld id="{DEC8F7F9-57EC-49CF-9FCD-2B781E4B449F}" type="slidenum">
+              <a:rPr lang="en-US" smtClean="0"/>
+              <a:t>27</a:t>
+            </a:fld>
+            <a:endParaRPr lang="en-US"/>
+          </a:p>
+        </p:txBody>
+      </p:sp>
+    </p:spTree>
+    <p:extLst>
+      <p:ext uri="{BB962C8B-B14F-4D97-AF65-F5344CB8AC3E}">
+        <p14:creationId xmlns:p14="http://schemas.microsoft.com/office/powerpoint/2010/main" val="700969359"/>
       </p:ext>
     </p:extLst>
   </p:cSld>
@@ -1072,11 +2321,7 @@
           <a:p>
             <a:r>
               <a:rPr lang="en-US" dirty="0" smtClean="0"/>
-              <a:t>Ask the</a:t>
-            </a:r>
-            <a:r>
-              <a:rPr lang="en-US" baseline="0" dirty="0" smtClean="0"/>
-              <a:t> students if they know what the mailbox/cubbyholes are</a:t>
+              <a:t>Direct the students to trinket, and have them follow along with the presentation.</a:t>
             </a:r>
             <a:endParaRPr lang="en-US" dirty="0"/>
           </a:p>
@@ -1099,7 +2344,7 @@
           <a:p>
             <a:fld id="{DEC8F7F9-57EC-49CF-9FCD-2B781E4B449F}" type="slidenum">
               <a:rPr lang="en-US" smtClean="0"/>
-              <a:t>11</a:t>
+              <a:t>6</a:t>
             </a:fld>
             <a:endParaRPr lang="en-US"/>
           </a:p>
@@ -1108,7 +2353,7 @@
     </p:spTree>
     <p:extLst>
       <p:ext uri="{BB962C8B-B14F-4D97-AF65-F5344CB8AC3E}">
-        <p14:creationId xmlns:p14="http://schemas.microsoft.com/office/powerpoint/2010/main" val="3887953302"/>
+        <p14:creationId xmlns:p14="http://schemas.microsoft.com/office/powerpoint/2010/main" val="670394549"/>
       </p:ext>
     </p:extLst>
   </p:cSld>
@@ -1164,11 +2409,11 @@
           <a:p>
             <a:r>
               <a:rPr lang="en-US" dirty="0" smtClean="0"/>
-              <a:t>Note that variable</a:t>
+              <a:t>Explain how</a:t>
             </a:r>
             <a:r>
               <a:rPr lang="en-US" baseline="0" dirty="0" smtClean="0"/>
-              <a:t>s must have no spaces, no special characters</a:t>
+              <a:t> trinket works… students will write instructions on the left, then click “Run” for the instructions to execute</a:t>
             </a:r>
             <a:endParaRPr lang="en-US" dirty="0"/>
           </a:p>
@@ -1191,7 +2436,7 @@
           <a:p>
             <a:fld id="{DEC8F7F9-57EC-49CF-9FCD-2B781E4B449F}" type="slidenum">
               <a:rPr lang="en-US" smtClean="0"/>
-              <a:t>12</a:t>
+              <a:t>7</a:t>
             </a:fld>
             <a:endParaRPr lang="en-US"/>
           </a:p>
@@ -1200,7 +2445,7 @@
     </p:spTree>
     <p:extLst>
       <p:ext uri="{BB962C8B-B14F-4D97-AF65-F5344CB8AC3E}">
-        <p14:creationId xmlns:p14="http://schemas.microsoft.com/office/powerpoint/2010/main" val="3591367024"/>
+        <p14:creationId xmlns:p14="http://schemas.microsoft.com/office/powerpoint/2010/main" val="3711519569"/>
       </p:ext>
     </p:extLst>
   </p:cSld>
@@ -1256,11 +2501,27 @@
           <a:p>
             <a:r>
               <a:rPr lang="en-US" dirty="0" smtClean="0"/>
-              <a:t>Explain that in a real life conversation, people ask questions and remember what the other person says. A computer program works in the same way; it asks questions to the user, and remembers their answers! In</a:t>
+              <a:t>Direct the students to type this into their trinket instance and click</a:t>
             </a:r>
             <a:r>
               <a:rPr lang="en-US" baseline="0" dirty="0" smtClean="0"/>
-              <a:t> Python, the answers the user enters are stored within variables.</a:t>
+              <a:t> run. Emphasize that the </a:t>
+            </a:r>
+            <a:r>
+              <a:rPr lang="en-US" b="1" baseline="0" dirty="0" smtClean="0"/>
+              <a:t>print(“</a:t>
+            </a:r>
+            <a:r>
+              <a:rPr lang="en-US" baseline="0" dirty="0" smtClean="0"/>
+              <a:t> and </a:t>
+            </a:r>
+            <a:r>
+              <a:rPr lang="en-US" b="1" baseline="0" dirty="0" smtClean="0"/>
+              <a:t>“)</a:t>
+            </a:r>
+            <a:r>
+              <a:rPr lang="en-US" baseline="0" dirty="0" smtClean="0"/>
+              <a:t> parts have to be exactly the same.</a:t>
             </a:r>
             <a:endParaRPr lang="en-US" dirty="0"/>
           </a:p>
@@ -1283,7 +2544,7 @@
           <a:p>
             <a:fld id="{DEC8F7F9-57EC-49CF-9FCD-2B781E4B449F}" type="slidenum">
               <a:rPr lang="en-US" smtClean="0"/>
-              <a:t>14</a:t>
+              <a:t>8</a:t>
             </a:fld>
             <a:endParaRPr lang="en-US"/>
           </a:p>
@@ -1292,7 +2553,7 @@
     </p:spTree>
     <p:extLst>
       <p:ext uri="{BB962C8B-B14F-4D97-AF65-F5344CB8AC3E}">
-        <p14:creationId xmlns:p14="http://schemas.microsoft.com/office/powerpoint/2010/main" val="1674417103"/>
+        <p14:creationId xmlns:p14="http://schemas.microsoft.com/office/powerpoint/2010/main" val="442973681"/>
       </p:ext>
     </p:extLst>
   </p:cSld>
@@ -1348,7 +2609,7 @@
           <a:p>
             <a:r>
               <a:rPr lang="en-US" dirty="0" smtClean="0"/>
-              <a:t>Ask the students what they think this will do</a:t>
+              <a:t>Give the students a chance to change the message.</a:t>
             </a:r>
             <a:endParaRPr lang="en-US" dirty="0"/>
           </a:p>
@@ -1371,7 +2632,7 @@
           <a:p>
             <a:fld id="{DEC8F7F9-57EC-49CF-9FCD-2B781E4B449F}" type="slidenum">
               <a:rPr lang="en-US" smtClean="0"/>
-              <a:t>15</a:t>
+              <a:t>9</a:t>
             </a:fld>
             <a:endParaRPr lang="en-US"/>
           </a:p>
@@ -1380,7 +2641,7 @@
     </p:spTree>
     <p:extLst>
       <p:ext uri="{BB962C8B-B14F-4D97-AF65-F5344CB8AC3E}">
-        <p14:creationId xmlns:p14="http://schemas.microsoft.com/office/powerpoint/2010/main" val="3545613084"/>
+        <p14:creationId xmlns:p14="http://schemas.microsoft.com/office/powerpoint/2010/main" val="1836874895"/>
       </p:ext>
     </p:extLst>
   </p:cSld>
@@ -1436,11 +2697,11 @@
           <a:p>
             <a:r>
               <a:rPr lang="en-US" dirty="0" smtClean="0"/>
-              <a:t>Walk</a:t>
+              <a:t>This is a quick</a:t>
             </a:r>
             <a:r>
               <a:rPr lang="en-US" baseline="0" dirty="0" smtClean="0"/>
-              <a:t> through the example line by line</a:t>
+              <a:t> note to emphasize the need for double quotes, sometimes this syntax trips the students up.</a:t>
             </a:r>
             <a:endParaRPr lang="en-US" dirty="0"/>
           </a:p>
@@ -1463,7 +2724,7 @@
           <a:p>
             <a:fld id="{DEC8F7F9-57EC-49CF-9FCD-2B781E4B449F}" type="slidenum">
               <a:rPr lang="en-US" smtClean="0"/>
-              <a:t>16</a:t>
+              <a:t>10</a:t>
             </a:fld>
             <a:endParaRPr lang="en-US"/>
           </a:p>
@@ -1472,7 +2733,7 @@
     </p:spTree>
     <p:extLst>
       <p:ext uri="{BB962C8B-B14F-4D97-AF65-F5344CB8AC3E}">
-        <p14:creationId xmlns:p14="http://schemas.microsoft.com/office/powerpoint/2010/main" val="568709894"/>
+        <p14:creationId xmlns:p14="http://schemas.microsoft.com/office/powerpoint/2010/main" val="621370457"/>
       </p:ext>
     </p:extLst>
   </p:cSld>
@@ -1528,11 +2789,34 @@
           <a:p>
             <a:r>
               <a:rPr lang="en-US" dirty="0" smtClean="0"/>
-              <a:t>In</a:t>
+              <a:t>Ask the</a:t>
             </a:r>
             <a:r>
               <a:rPr lang="en-US" baseline="0" dirty="0" smtClean="0"/>
-              <a:t> a real conversation, one person would respond differently based on what the other person says.</a:t>
+              <a:t> students if they know what the image is – mailbox/cubbyholes.</a:t>
+            </a:r>
+          </a:p>
+          <a:p>
+            <a:r>
+              <a:rPr lang="en-US" baseline="0" dirty="0" smtClean="0"/>
+              <a:t>Explain that </a:t>
+            </a:r>
+            <a:r>
+              <a:rPr lang="en-US" i="1" baseline="0" dirty="0" smtClean="0"/>
+              <a:t>variables</a:t>
+            </a:r>
+            <a:r>
+              <a:rPr lang="en-US" i="0" baseline="0" dirty="0" smtClean="0"/>
+              <a:t> in computer science are kind of like this – they are containers for data.</a:t>
+            </a:r>
+          </a:p>
+          <a:p>
+            <a:endParaRPr lang="en-US" i="0" baseline="0" dirty="0" smtClean="0"/>
+          </a:p>
+          <a:p>
+            <a:r>
+              <a:rPr lang="en-US" i="0" baseline="0" dirty="0" smtClean="0"/>
+              <a:t>This may not make much sense yet, but this example can be used to make variables a little more tangible. Setting a variable is like putting something into a cubbyhole, and using its value is like looking into the cubbyhole.</a:t>
             </a:r>
             <a:endParaRPr lang="en-US" dirty="0"/>
           </a:p>
@@ -1555,7 +2839,7 @@
           <a:p>
             <a:fld id="{DEC8F7F9-57EC-49CF-9FCD-2B781E4B449F}" type="slidenum">
               <a:rPr lang="en-US" smtClean="0"/>
-              <a:t>17</a:t>
+              <a:t>11</a:t>
             </a:fld>
             <a:endParaRPr lang="en-US"/>
           </a:p>
@@ -1564,7 +2848,7 @@
     </p:spTree>
     <p:extLst>
       <p:ext uri="{BB962C8B-B14F-4D97-AF65-F5344CB8AC3E}">
-        <p14:creationId xmlns:p14="http://schemas.microsoft.com/office/powerpoint/2010/main" val="1865151885"/>
+        <p14:creationId xmlns:p14="http://schemas.microsoft.com/office/powerpoint/2010/main" val="3887953302"/>
       </p:ext>
     </p:extLst>
   </p:cSld>
@@ -1620,11 +2904,11 @@
           <a:p>
             <a:r>
               <a:rPr lang="en-US" dirty="0" smtClean="0"/>
-              <a:t>What will happen if the user enters blue? What will happen if the user</a:t>
+              <a:t>Ask the students</a:t>
             </a:r>
             <a:r>
               <a:rPr lang="en-US" baseline="0" dirty="0" smtClean="0"/>
-              <a:t> enters something other than blue?</a:t>
+              <a:t> if they can guess what this does. They can type it out into trinket to see what happens. Then reveal the answer.</a:t>
             </a:r>
           </a:p>
           <a:p>
@@ -1632,20 +2916,12 @@
           </a:p>
           <a:p>
             <a:r>
+              <a:rPr lang="en-US" b="1" dirty="0" smtClean="0"/>
+              <a:t>Note that variable names</a:t>
+            </a:r>
+            <a:r>
               <a:rPr lang="en-US" b="1" baseline="0" dirty="0" smtClean="0"/>
-              <a:t>Indentation</a:t>
-            </a:r>
-            <a:r>
-              <a:rPr lang="en-US" b="0" i="0" baseline="0" dirty="0" smtClean="0"/>
-              <a:t> tells the program what to do </a:t>
-            </a:r>
-            <a:r>
-              <a:rPr lang="en-US" b="0" i="1" baseline="0" dirty="0" smtClean="0"/>
-              <a:t>if</a:t>
-            </a:r>
-            <a:r>
-              <a:rPr lang="en-US" b="0" i="0" baseline="0" dirty="0" smtClean="0"/>
-              <a:t> the condition is met. </a:t>
+              <a:t> must have no spaces, no special characters</a:t>
             </a:r>
             <a:endParaRPr lang="en-US" b="1" dirty="0"/>
           </a:p>
@@ -1668,7 +2944,7 @@
           <a:p>
             <a:fld id="{DEC8F7F9-57EC-49CF-9FCD-2B781E4B449F}" type="slidenum">
               <a:rPr lang="en-US" smtClean="0"/>
-              <a:t>18</a:t>
+              <a:t>12</a:t>
             </a:fld>
             <a:endParaRPr lang="en-US"/>
           </a:p>
@@ -1677,7 +2953,7 @@
     </p:spTree>
     <p:extLst>
       <p:ext uri="{BB962C8B-B14F-4D97-AF65-F5344CB8AC3E}">
-        <p14:creationId xmlns:p14="http://schemas.microsoft.com/office/powerpoint/2010/main" val="2337393084"/>
+        <p14:creationId xmlns:p14="http://schemas.microsoft.com/office/powerpoint/2010/main" val="3591367024"/>
       </p:ext>
     </p:extLst>
   </p:cSld>
@@ -1877,7 +3153,7 @@
             <a:fld id="{1C2D31DE-C454-491C-B5C3-F097855E3DF7}" type="datetime4">
               <a:rPr lang="en-US" smtClean="0"/>
               <a:pPr/>
-              <a:t>May 29, 2019</a:t>
+              <a:t>June 5, 2019</a:t>
             </a:fld>
             <a:endParaRPr lang="en-US" dirty="0"/>
           </a:p>
@@ -5277,7 +6553,7 @@
           <a:p>
             <a:fld id="{5958763E-B898-436D-883D-03711491D54A}" type="datetimeFigureOut">
               <a:rPr lang="en-US" smtClean="0"/>
-              <a:t>5/29/2019</a:t>
+              <a:t>6/5/2019</a:t>
             </a:fld>
             <a:endParaRPr lang="en-US"/>
           </a:p>
@@ -5478,7 +6754,7 @@
           <a:p>
             <a:fld id="{5958763E-B898-436D-883D-03711491D54A}" type="datetimeFigureOut">
               <a:rPr lang="en-US" smtClean="0"/>
-              <a:t>5/29/2019</a:t>
+              <a:t>6/5/2019</a:t>
             </a:fld>
             <a:endParaRPr lang="en-US"/>
           </a:p>
@@ -5735,7 +7011,7 @@
           <a:p>
             <a:fld id="{5958763E-B898-436D-883D-03711491D54A}" type="datetimeFigureOut">
               <a:rPr lang="en-US" smtClean="0"/>
-              <a:t>5/29/2019</a:t>
+              <a:t>6/5/2019</a:t>
             </a:fld>
             <a:endParaRPr lang="en-US"/>
           </a:p>
@@ -6090,7 +7366,7 @@
           <a:p>
             <a:fld id="{5958763E-B898-436D-883D-03711491D54A}" type="datetimeFigureOut">
               <a:rPr lang="en-US" smtClean="0"/>
-              <a:t>5/29/2019</a:t>
+              <a:t>6/5/2019</a:t>
             </a:fld>
             <a:endParaRPr lang="en-US"/>
           </a:p>
@@ -6513,7 +7789,7 @@
           <a:p>
             <a:fld id="{5958763E-B898-436D-883D-03711491D54A}" type="datetimeFigureOut">
               <a:rPr lang="en-US" smtClean="0"/>
-              <a:t>5/29/2019</a:t>
+              <a:t>6/5/2019</a:t>
             </a:fld>
             <a:endParaRPr lang="en-US"/>
           </a:p>
@@ -7021,7 +8297,7 @@
           <a:p>
             <a:fld id="{5958763E-B898-436D-883D-03711491D54A}" type="datetimeFigureOut">
               <a:rPr lang="en-US" smtClean="0"/>
-              <a:t>5/29/2019</a:t>
+              <a:t>6/5/2019</a:t>
             </a:fld>
             <a:endParaRPr lang="en-US"/>
           </a:p>
@@ -7479,7 +8755,7 @@
           <a:p>
             <a:fld id="{5958763E-B898-436D-883D-03711491D54A}" type="datetimeFigureOut">
               <a:rPr lang="en-US" smtClean="0"/>
-              <a:t>5/29/2019</a:t>
+              <a:t>6/5/2019</a:t>
             </a:fld>
             <a:endParaRPr lang="en-US"/>
           </a:p>
@@ -8097,7 +9373,7 @@
           <a:p>
             <a:fld id="{5958763E-B898-436D-883D-03711491D54A}" type="datetimeFigureOut">
               <a:rPr lang="en-US" smtClean="0"/>
-              <a:t>5/29/2019</a:t>
+              <a:t>6/5/2019</a:t>
             </a:fld>
             <a:endParaRPr lang="en-US"/>
           </a:p>
@@ -8875,7 +10151,7 @@
           <a:p>
             <a:fld id="{5958763E-B898-436D-883D-03711491D54A}" type="datetimeFigureOut">
               <a:rPr lang="en-US" smtClean="0"/>
-              <a:t>5/29/2019</a:t>
+              <a:t>6/5/2019</a:t>
             </a:fld>
             <a:endParaRPr lang="en-US"/>
           </a:p>
@@ -8986,7 +10262,7 @@
           <a:p>
             <a:fld id="{5958763E-B898-436D-883D-03711491D54A}" type="datetimeFigureOut">
               <a:rPr lang="en-US" smtClean="0"/>
-              <a:t>5/29/2019</a:t>
+              <a:t>6/5/2019</a:t>
             </a:fld>
             <a:endParaRPr lang="en-US"/>
           </a:p>
@@ -9328,7 +10604,7 @@
             <a:fld id="{1C2D31DE-C454-491C-B5C3-F097855E3DF7}" type="datetime4">
               <a:rPr lang="en-US" smtClean="0"/>
               <a:pPr/>
-              <a:t>May 29, 2019</a:t>
+              <a:t>June 5, 2019</a:t>
             </a:fld>
             <a:endParaRPr lang="en-US" dirty="0"/>
           </a:p>
@@ -12488,7 +13764,7 @@
           <a:p>
             <a:fld id="{5958763E-B898-436D-883D-03711491D54A}" type="datetimeFigureOut">
               <a:rPr lang="en-US" smtClean="0"/>
-              <a:t>5/29/2019</a:t>
+              <a:t>6/5/2019</a:t>
             </a:fld>
             <a:endParaRPr lang="en-US"/>
           </a:p>
@@ -12619,7 +13895,7 @@
           <a:p>
             <a:fld id="{5958763E-B898-436D-883D-03711491D54A}" type="datetimeFigureOut">
               <a:rPr lang="en-US" smtClean="0"/>
-              <a:t>5/29/2019</a:t>
+              <a:t>6/5/2019</a:t>
             </a:fld>
             <a:endParaRPr lang="en-US"/>
           </a:p>
@@ -12750,7 +14026,7 @@
           <a:p>
             <a:fld id="{5958763E-B898-436D-883D-03711491D54A}" type="datetimeFigureOut">
               <a:rPr lang="en-US" smtClean="0"/>
-              <a:t>5/29/2019</a:t>
+              <a:t>6/5/2019</a:t>
             </a:fld>
             <a:endParaRPr lang="en-US"/>
           </a:p>
@@ -12881,7 +14157,7 @@
           <a:p>
             <a:fld id="{5958763E-B898-436D-883D-03711491D54A}" type="datetimeFigureOut">
               <a:rPr lang="en-US" smtClean="0"/>
-              <a:t>5/29/2019</a:t>
+              <a:t>6/5/2019</a:t>
             </a:fld>
             <a:endParaRPr lang="en-US"/>
           </a:p>
@@ -13012,7 +14288,7 @@
           <a:p>
             <a:fld id="{5958763E-B898-436D-883D-03711491D54A}" type="datetimeFigureOut">
               <a:rPr lang="en-US" smtClean="0"/>
-              <a:t>5/29/2019</a:t>
+              <a:t>6/5/2019</a:t>
             </a:fld>
             <a:endParaRPr lang="en-US"/>
           </a:p>
@@ -13143,7 +14419,7 @@
           <a:p>
             <a:fld id="{5958763E-B898-436D-883D-03711491D54A}" type="datetimeFigureOut">
               <a:rPr lang="en-US" smtClean="0"/>
-              <a:t>5/29/2019</a:t>
+              <a:t>6/5/2019</a:t>
             </a:fld>
             <a:endParaRPr lang="en-US"/>
           </a:p>
@@ -13274,7 +14550,7 @@
           <a:p>
             <a:fld id="{5958763E-B898-436D-883D-03711491D54A}" type="datetimeFigureOut">
               <a:rPr lang="en-US" smtClean="0"/>
-              <a:t>5/29/2019</a:t>
+              <a:t>6/5/2019</a:t>
             </a:fld>
             <a:endParaRPr lang="en-US"/>
           </a:p>
@@ -13405,7 +14681,7 @@
           <a:p>
             <a:fld id="{5958763E-B898-436D-883D-03711491D54A}" type="datetimeFigureOut">
               <a:rPr lang="en-US" smtClean="0"/>
-              <a:t>5/29/2019</a:t>
+              <a:t>6/5/2019</a:t>
             </a:fld>
             <a:endParaRPr lang="en-US"/>
           </a:p>
@@ -13545,7 +14821,7 @@
           <a:p>
             <a:fld id="{5958763E-B898-436D-883D-03711491D54A}" type="datetimeFigureOut">
               <a:rPr lang="en-US" smtClean="0"/>
-              <a:t>5/29/2019</a:t>
+              <a:t>6/5/2019</a:t>
             </a:fld>
             <a:endParaRPr lang="en-US"/>
           </a:p>
@@ -16906,7 +18182,7 @@
             <a:fld id="{1C2D31DE-C454-491C-B5C3-F097855E3DF7}" type="datetime4">
               <a:rPr lang="en-US" smtClean="0"/>
               <a:pPr/>
-              <a:t>May 29, 2019</a:t>
+              <a:t>June 5, 2019</a:t>
             </a:fld>
             <a:endParaRPr lang="en-US" dirty="0"/>
           </a:p>
@@ -29151,7 +30427,7 @@
           <a:p>
             <a:fld id="{5958763E-B898-436D-883D-03711491D54A}" type="datetimeFigureOut">
               <a:rPr lang="en-US" smtClean="0"/>
-              <a:t>5/29/2019</a:t>
+              <a:t>6/5/2019</a:t>
             </a:fld>
             <a:endParaRPr lang="en-US"/>
           </a:p>
@@ -29560,7 +30836,7 @@
           <a:p>
             <a:fld id="{5958763E-B898-436D-883D-03711491D54A}" type="datetimeFigureOut">
               <a:rPr lang="en-US" smtClean="0"/>
-              <a:t>5/29/2019</a:t>
+              <a:t>6/5/2019</a:t>
             </a:fld>
             <a:endParaRPr lang="en-US"/>
           </a:p>
@@ -29861,7 +31137,7 @@
           <a:p>
             <a:fld id="{5958763E-B898-436D-883D-03711491D54A}" type="datetimeFigureOut">
               <a:rPr lang="en-US" smtClean="0"/>
-              <a:t>5/29/2019</a:t>
+              <a:t>6/5/2019</a:t>
             </a:fld>
             <a:endParaRPr lang="en-US"/>
           </a:p>
@@ -30069,7 +31345,7 @@
           <a:p>
             <a:fld id="{5958763E-B898-436D-883D-03711491D54A}" type="datetimeFigureOut">
               <a:rPr lang="en-US" smtClean="0"/>
-              <a:t>5/29/2019</a:t>
+              <a:t>6/5/2019</a:t>
             </a:fld>
             <a:endParaRPr lang="en-US"/>
           </a:p>
@@ -30337,7 +31613,7 @@
           <a:p>
             <a:fld id="{5958763E-B898-436D-883D-03711491D54A}" type="datetimeFigureOut">
               <a:rPr lang="en-US" smtClean="0"/>
-              <a:t>5/29/2019</a:t>
+              <a:t>6/5/2019</a:t>
             </a:fld>
             <a:endParaRPr lang="en-US"/>
           </a:p>
@@ -30854,7 +32130,7 @@
           <a:p>
             <a:fld id="{5958763E-B898-436D-883D-03711491D54A}" type="datetimeFigureOut">
               <a:rPr lang="en-US" smtClean="0"/>
-              <a:t>5/29/2019</a:t>
+              <a:t>6/5/2019</a:t>
             </a:fld>
             <a:endParaRPr lang="en-US"/>
           </a:p>
@@ -31342,7 +32618,7 @@
           <a:p>
             <a:fld id="{5958763E-B898-436D-883D-03711491D54A}" type="datetimeFigureOut">
               <a:rPr lang="en-US" smtClean="0"/>
-              <a:t>5/29/2019</a:t>
+              <a:t>6/5/2019</a:t>
             </a:fld>
             <a:endParaRPr lang="en-US"/>
           </a:p>
@@ -32168,7 +33444,7 @@
           <a:p>
             <a:fld id="{5958763E-B898-436D-883D-03711491D54A}" type="datetimeFigureOut">
               <a:rPr lang="en-US" smtClean="0"/>
-              <a:t>5/29/2019</a:t>
+              <a:t>6/5/2019</a:t>
             </a:fld>
             <a:endParaRPr lang="en-US"/>
           </a:p>
@@ -32376,7 +33652,7 @@
           <a:p>
             <a:fld id="{5958763E-B898-436D-883D-03711491D54A}" type="datetimeFigureOut">
               <a:rPr lang="en-US" smtClean="0"/>
-              <a:t>5/29/2019</a:t>
+              <a:t>6/5/2019</a:t>
             </a:fld>
             <a:endParaRPr lang="en-US"/>
           </a:p>
@@ -32718,7 +33994,7 @@
           <a:p>
             <a:fld id="{5958763E-B898-436D-883D-03711491D54A}" type="datetimeFigureOut">
               <a:rPr lang="en-US" smtClean="0"/>
-              <a:t>5/29/2019</a:t>
+              <a:t>6/5/2019</a:t>
             </a:fld>
             <a:endParaRPr lang="en-US"/>
           </a:p>
@@ -32955,7 +34231,7 @@
           <a:p>
             <a:fld id="{5958763E-B898-436D-883D-03711491D54A}" type="datetimeFigureOut">
               <a:rPr lang="en-US" smtClean="0"/>
-              <a:t>5/29/2019</a:t>
+              <a:t>6/5/2019</a:t>
             </a:fld>
             <a:endParaRPr lang="en-US"/>
           </a:p>
@@ -33206,7 +34482,7 @@
           <a:p>
             <a:fld id="{5958763E-B898-436D-883D-03711491D54A}" type="datetimeFigureOut">
               <a:rPr lang="en-US" smtClean="0"/>
-              <a:t>5/29/2019</a:t>
+              <a:t>6/5/2019</a:t>
             </a:fld>
             <a:endParaRPr lang="en-US"/>
           </a:p>
@@ -41618,7 +42894,7 @@
             <a:fld id="{1C2D31DE-C454-491C-B5C3-F097855E3DF7}" type="datetime4">
               <a:rPr lang="en-US" smtClean="0"/>
               <a:pPr/>
-              <a:t>May 29, 2019</a:t>
+              <a:t>June 5, 2019</a:t>
             </a:fld>
             <a:endParaRPr lang="en-US" dirty="0"/>
           </a:p>
@@ -44116,7 +45392,7 @@
                   </a:solidFill>
                 </a:ln>
                 <a:noFill/>
-                <a:hlinkClick r:id="rId2"/>
+                <a:hlinkClick r:id="rId3"/>
               </a:rPr>
               <a:t>Kahoot</a:t>
             </a:r>
@@ -44214,13 +45490,13 @@
             </a:pPr>
             <a:r>
               <a:rPr lang="en-US" sz="3600" smtClean="0">
-                <a:hlinkClick r:id="rId2"/>
+                <a:hlinkClick r:id="rId3"/>
               </a:rPr>
               <a:t>https</a:t>
             </a:r>
             <a:r>
               <a:rPr lang="en-US" sz="3600" dirty="0">
-                <a:hlinkClick r:id="rId2"/>
+                <a:hlinkClick r:id="rId3"/>
               </a:rPr>
               <a:t>://github.com/hylandtechoutreach/python-camp</a:t>
             </a:r>
@@ -46017,7 +47293,7 @@
           <p:nvPr/>
         </p:nvPicPr>
         <p:blipFill>
-          <a:blip r:embed="rId2"/>
+          <a:blip r:embed="rId3"/>
           <a:stretch>
             <a:fillRect/>
           </a:stretch>

</xml_diff>

<commit_message>
update content link in ppt
</commit_message>
<xml_diff>
--- a/ProgrammingWithPython.pptx
+++ b/ProgrammingWithPython.pptx
@@ -234,7 +234,7 @@
           <a:p>
             <a:fld id="{19104133-B5B0-4351-8158-4F0E5EB1E2BF}" type="datetimeFigureOut">
               <a:rPr lang="en-US" smtClean="0"/>
-              <a:t>6/5/2019</a:t>
+              <a:t>6/27/2019</a:t>
             </a:fld>
             <a:endParaRPr lang="en-US"/>
           </a:p>
@@ -1917,11 +1917,7 @@
             </a:r>
             <a:r>
               <a:rPr lang="en-US" b="0" baseline="0" dirty="0" smtClean="0"/>
-              <a:t> code (under it, and </a:t>
-            </a:r>
-            <a:r>
-              <a:rPr lang="en-US" b="0" baseline="0" dirty="0" smtClean="0"/>
-              <a:t>indented). The </a:t>
+              <a:t> code (under it, and indented). The </a:t>
             </a:r>
             <a:r>
               <a:rPr lang="en-US" b="1" baseline="0" dirty="0" smtClean="0"/>
@@ -3153,7 +3149,7 @@
             <a:fld id="{1C2D31DE-C454-491C-B5C3-F097855E3DF7}" type="datetime4">
               <a:rPr lang="en-US" smtClean="0"/>
               <a:pPr/>
-              <a:t>June 5, 2019</a:t>
+              <a:t>June 27, 2019</a:t>
             </a:fld>
             <a:endParaRPr lang="en-US" dirty="0"/>
           </a:p>
@@ -6553,7 +6549,7 @@
           <a:p>
             <a:fld id="{5958763E-B898-436D-883D-03711491D54A}" type="datetimeFigureOut">
               <a:rPr lang="en-US" smtClean="0"/>
-              <a:t>6/5/2019</a:t>
+              <a:t>6/27/2019</a:t>
             </a:fld>
             <a:endParaRPr lang="en-US"/>
           </a:p>
@@ -6754,7 +6750,7 @@
           <a:p>
             <a:fld id="{5958763E-B898-436D-883D-03711491D54A}" type="datetimeFigureOut">
               <a:rPr lang="en-US" smtClean="0"/>
-              <a:t>6/5/2019</a:t>
+              <a:t>6/27/2019</a:t>
             </a:fld>
             <a:endParaRPr lang="en-US"/>
           </a:p>
@@ -7011,7 +7007,7 @@
           <a:p>
             <a:fld id="{5958763E-B898-436D-883D-03711491D54A}" type="datetimeFigureOut">
               <a:rPr lang="en-US" smtClean="0"/>
-              <a:t>6/5/2019</a:t>
+              <a:t>6/27/2019</a:t>
             </a:fld>
             <a:endParaRPr lang="en-US"/>
           </a:p>
@@ -7366,7 +7362,7 @@
           <a:p>
             <a:fld id="{5958763E-B898-436D-883D-03711491D54A}" type="datetimeFigureOut">
               <a:rPr lang="en-US" smtClean="0"/>
-              <a:t>6/5/2019</a:t>
+              <a:t>6/27/2019</a:t>
             </a:fld>
             <a:endParaRPr lang="en-US"/>
           </a:p>
@@ -7789,7 +7785,7 @@
           <a:p>
             <a:fld id="{5958763E-B898-436D-883D-03711491D54A}" type="datetimeFigureOut">
               <a:rPr lang="en-US" smtClean="0"/>
-              <a:t>6/5/2019</a:t>
+              <a:t>6/27/2019</a:t>
             </a:fld>
             <a:endParaRPr lang="en-US"/>
           </a:p>
@@ -8297,7 +8293,7 @@
           <a:p>
             <a:fld id="{5958763E-B898-436D-883D-03711491D54A}" type="datetimeFigureOut">
               <a:rPr lang="en-US" smtClean="0"/>
-              <a:t>6/5/2019</a:t>
+              <a:t>6/27/2019</a:t>
             </a:fld>
             <a:endParaRPr lang="en-US"/>
           </a:p>
@@ -8755,7 +8751,7 @@
           <a:p>
             <a:fld id="{5958763E-B898-436D-883D-03711491D54A}" type="datetimeFigureOut">
               <a:rPr lang="en-US" smtClean="0"/>
-              <a:t>6/5/2019</a:t>
+              <a:t>6/27/2019</a:t>
             </a:fld>
             <a:endParaRPr lang="en-US"/>
           </a:p>
@@ -9373,7 +9369,7 @@
           <a:p>
             <a:fld id="{5958763E-B898-436D-883D-03711491D54A}" type="datetimeFigureOut">
               <a:rPr lang="en-US" smtClean="0"/>
-              <a:t>6/5/2019</a:t>
+              <a:t>6/27/2019</a:t>
             </a:fld>
             <a:endParaRPr lang="en-US"/>
           </a:p>
@@ -10151,7 +10147,7 @@
           <a:p>
             <a:fld id="{5958763E-B898-436D-883D-03711491D54A}" type="datetimeFigureOut">
               <a:rPr lang="en-US" smtClean="0"/>
-              <a:t>6/5/2019</a:t>
+              <a:t>6/27/2019</a:t>
             </a:fld>
             <a:endParaRPr lang="en-US"/>
           </a:p>
@@ -10262,7 +10258,7 @@
           <a:p>
             <a:fld id="{5958763E-B898-436D-883D-03711491D54A}" type="datetimeFigureOut">
               <a:rPr lang="en-US" smtClean="0"/>
-              <a:t>6/5/2019</a:t>
+              <a:t>6/27/2019</a:t>
             </a:fld>
             <a:endParaRPr lang="en-US"/>
           </a:p>
@@ -10604,7 +10600,7 @@
             <a:fld id="{1C2D31DE-C454-491C-B5C3-F097855E3DF7}" type="datetime4">
               <a:rPr lang="en-US" smtClean="0"/>
               <a:pPr/>
-              <a:t>June 5, 2019</a:t>
+              <a:t>June 27, 2019</a:t>
             </a:fld>
             <a:endParaRPr lang="en-US" dirty="0"/>
           </a:p>
@@ -13764,7 +13760,7 @@
           <a:p>
             <a:fld id="{5958763E-B898-436D-883D-03711491D54A}" type="datetimeFigureOut">
               <a:rPr lang="en-US" smtClean="0"/>
-              <a:t>6/5/2019</a:t>
+              <a:t>6/27/2019</a:t>
             </a:fld>
             <a:endParaRPr lang="en-US"/>
           </a:p>
@@ -13895,7 +13891,7 @@
           <a:p>
             <a:fld id="{5958763E-B898-436D-883D-03711491D54A}" type="datetimeFigureOut">
               <a:rPr lang="en-US" smtClean="0"/>
-              <a:t>6/5/2019</a:t>
+              <a:t>6/27/2019</a:t>
             </a:fld>
             <a:endParaRPr lang="en-US"/>
           </a:p>
@@ -14026,7 +14022,7 @@
           <a:p>
             <a:fld id="{5958763E-B898-436D-883D-03711491D54A}" type="datetimeFigureOut">
               <a:rPr lang="en-US" smtClean="0"/>
-              <a:t>6/5/2019</a:t>
+              <a:t>6/27/2019</a:t>
             </a:fld>
             <a:endParaRPr lang="en-US"/>
           </a:p>
@@ -14157,7 +14153,7 @@
           <a:p>
             <a:fld id="{5958763E-B898-436D-883D-03711491D54A}" type="datetimeFigureOut">
               <a:rPr lang="en-US" smtClean="0"/>
-              <a:t>6/5/2019</a:t>
+              <a:t>6/27/2019</a:t>
             </a:fld>
             <a:endParaRPr lang="en-US"/>
           </a:p>
@@ -14288,7 +14284,7 @@
           <a:p>
             <a:fld id="{5958763E-B898-436D-883D-03711491D54A}" type="datetimeFigureOut">
               <a:rPr lang="en-US" smtClean="0"/>
-              <a:t>6/5/2019</a:t>
+              <a:t>6/27/2019</a:t>
             </a:fld>
             <a:endParaRPr lang="en-US"/>
           </a:p>
@@ -14419,7 +14415,7 @@
           <a:p>
             <a:fld id="{5958763E-B898-436D-883D-03711491D54A}" type="datetimeFigureOut">
               <a:rPr lang="en-US" smtClean="0"/>
-              <a:t>6/5/2019</a:t>
+              <a:t>6/27/2019</a:t>
             </a:fld>
             <a:endParaRPr lang="en-US"/>
           </a:p>
@@ -14550,7 +14546,7 @@
           <a:p>
             <a:fld id="{5958763E-B898-436D-883D-03711491D54A}" type="datetimeFigureOut">
               <a:rPr lang="en-US" smtClean="0"/>
-              <a:t>6/5/2019</a:t>
+              <a:t>6/27/2019</a:t>
             </a:fld>
             <a:endParaRPr lang="en-US"/>
           </a:p>
@@ -14681,7 +14677,7 @@
           <a:p>
             <a:fld id="{5958763E-B898-436D-883D-03711491D54A}" type="datetimeFigureOut">
               <a:rPr lang="en-US" smtClean="0"/>
-              <a:t>6/5/2019</a:t>
+              <a:t>6/27/2019</a:t>
             </a:fld>
             <a:endParaRPr lang="en-US"/>
           </a:p>
@@ -14821,7 +14817,7 @@
           <a:p>
             <a:fld id="{5958763E-B898-436D-883D-03711491D54A}" type="datetimeFigureOut">
               <a:rPr lang="en-US" smtClean="0"/>
-              <a:t>6/5/2019</a:t>
+              <a:t>6/27/2019</a:t>
             </a:fld>
             <a:endParaRPr lang="en-US"/>
           </a:p>
@@ -18182,7 +18178,7 @@
             <a:fld id="{1C2D31DE-C454-491C-B5C3-F097855E3DF7}" type="datetime4">
               <a:rPr lang="en-US" smtClean="0"/>
               <a:pPr/>
-              <a:t>June 5, 2019</a:t>
+              <a:t>June 27, 2019</a:t>
             </a:fld>
             <a:endParaRPr lang="en-US" dirty="0"/>
           </a:p>
@@ -30427,7 +30423,7 @@
           <a:p>
             <a:fld id="{5958763E-B898-436D-883D-03711491D54A}" type="datetimeFigureOut">
               <a:rPr lang="en-US" smtClean="0"/>
-              <a:t>6/5/2019</a:t>
+              <a:t>6/27/2019</a:t>
             </a:fld>
             <a:endParaRPr lang="en-US"/>
           </a:p>
@@ -30836,7 +30832,7 @@
           <a:p>
             <a:fld id="{5958763E-B898-436D-883D-03711491D54A}" type="datetimeFigureOut">
               <a:rPr lang="en-US" smtClean="0"/>
-              <a:t>6/5/2019</a:t>
+              <a:t>6/27/2019</a:t>
             </a:fld>
             <a:endParaRPr lang="en-US"/>
           </a:p>
@@ -31137,7 +31133,7 @@
           <a:p>
             <a:fld id="{5958763E-B898-436D-883D-03711491D54A}" type="datetimeFigureOut">
               <a:rPr lang="en-US" smtClean="0"/>
-              <a:t>6/5/2019</a:t>
+              <a:t>6/27/2019</a:t>
             </a:fld>
             <a:endParaRPr lang="en-US"/>
           </a:p>
@@ -31345,7 +31341,7 @@
           <a:p>
             <a:fld id="{5958763E-B898-436D-883D-03711491D54A}" type="datetimeFigureOut">
               <a:rPr lang="en-US" smtClean="0"/>
-              <a:t>6/5/2019</a:t>
+              <a:t>6/27/2019</a:t>
             </a:fld>
             <a:endParaRPr lang="en-US"/>
           </a:p>
@@ -31613,7 +31609,7 @@
           <a:p>
             <a:fld id="{5958763E-B898-436D-883D-03711491D54A}" type="datetimeFigureOut">
               <a:rPr lang="en-US" smtClean="0"/>
-              <a:t>6/5/2019</a:t>
+              <a:t>6/27/2019</a:t>
             </a:fld>
             <a:endParaRPr lang="en-US"/>
           </a:p>
@@ -32130,7 +32126,7 @@
           <a:p>
             <a:fld id="{5958763E-B898-436D-883D-03711491D54A}" type="datetimeFigureOut">
               <a:rPr lang="en-US" smtClean="0"/>
-              <a:t>6/5/2019</a:t>
+              <a:t>6/27/2019</a:t>
             </a:fld>
             <a:endParaRPr lang="en-US"/>
           </a:p>
@@ -32618,7 +32614,7 @@
           <a:p>
             <a:fld id="{5958763E-B898-436D-883D-03711491D54A}" type="datetimeFigureOut">
               <a:rPr lang="en-US" smtClean="0"/>
-              <a:t>6/5/2019</a:t>
+              <a:t>6/27/2019</a:t>
             </a:fld>
             <a:endParaRPr lang="en-US"/>
           </a:p>
@@ -33444,7 +33440,7 @@
           <a:p>
             <a:fld id="{5958763E-B898-436D-883D-03711491D54A}" type="datetimeFigureOut">
               <a:rPr lang="en-US" smtClean="0"/>
-              <a:t>6/5/2019</a:t>
+              <a:t>6/27/2019</a:t>
             </a:fld>
             <a:endParaRPr lang="en-US"/>
           </a:p>
@@ -33652,7 +33648,7 @@
           <a:p>
             <a:fld id="{5958763E-B898-436D-883D-03711491D54A}" type="datetimeFigureOut">
               <a:rPr lang="en-US" smtClean="0"/>
-              <a:t>6/5/2019</a:t>
+              <a:t>6/27/2019</a:t>
             </a:fld>
             <a:endParaRPr lang="en-US"/>
           </a:p>
@@ -33994,7 +33990,7 @@
           <a:p>
             <a:fld id="{5958763E-B898-436D-883D-03711491D54A}" type="datetimeFigureOut">
               <a:rPr lang="en-US" smtClean="0"/>
-              <a:t>6/5/2019</a:t>
+              <a:t>6/27/2019</a:t>
             </a:fld>
             <a:endParaRPr lang="en-US"/>
           </a:p>
@@ -34231,7 +34227,7 @@
           <a:p>
             <a:fld id="{5958763E-B898-436D-883D-03711491D54A}" type="datetimeFigureOut">
               <a:rPr lang="en-US" smtClean="0"/>
-              <a:t>6/5/2019</a:t>
+              <a:t>6/27/2019</a:t>
             </a:fld>
             <a:endParaRPr lang="en-US"/>
           </a:p>
@@ -34482,7 +34478,7 @@
           <a:p>
             <a:fld id="{5958763E-B898-436D-883D-03711491D54A}" type="datetimeFigureOut">
               <a:rPr lang="en-US" smtClean="0"/>
-              <a:t>6/5/2019</a:t>
+              <a:t>6/27/2019</a:t>
             </a:fld>
             <a:endParaRPr lang="en-US"/>
           </a:p>
@@ -42894,7 +42890,7 @@
             <a:fld id="{1C2D31DE-C454-491C-B5C3-F097855E3DF7}" type="datetime4">
               <a:rPr lang="en-US" smtClean="0"/>
               <a:pPr/>
-              <a:t>June 5, 2019</a:t>
+              <a:t>June 27, 2019</a:t>
             </a:fld>
             <a:endParaRPr lang="en-US" dirty="0"/>
           </a:p>
@@ -45482,25 +45478,27 @@
         </p:nvSpPr>
         <p:spPr/>
         <p:txBody>
-          <a:bodyPr anchor="ctr"/>
+          <a:bodyPr anchor="ctr">
+            <a:normAutofit/>
+          </a:bodyPr>
           <a:lstStyle/>
           <a:p>
             <a:pPr marL="57150" indent="0">
               <a:buNone/>
             </a:pPr>
             <a:r>
-              <a:rPr lang="en-US" sz="3600" smtClean="0">
+              <a:rPr lang="en-US" sz="8800" dirty="0">
                 <a:hlinkClick r:id="rId3"/>
               </a:rPr>
-              <a:t>https</a:t>
-            </a:r>
-            <a:r>
-              <a:rPr lang="en-US" sz="3600" dirty="0">
+              <a:t>https://</a:t>
+            </a:r>
+            <a:r>
+              <a:rPr lang="en-US" sz="8800" dirty="0" smtClean="0">
                 <a:hlinkClick r:id="rId3"/>
               </a:rPr>
-              <a:t>://github.com/hylandtechoutreach/python-camp</a:t>
-            </a:r>
-            <a:endParaRPr lang="en-US" sz="3600" dirty="0"/>
+              <a:t>bit.ly/2X2REJn</a:t>
+            </a:r>
+            <a:endParaRPr lang="en-US" sz="8800" dirty="0"/>
           </a:p>
         </p:txBody>
       </p:sp>

</xml_diff>

<commit_message>
Update to make GitHub the one source
</commit_message>
<xml_diff>
--- a/ProgrammingWithPython.pptx
+++ b/ProgrammingWithPython.pptx
@@ -5,7 +5,7 @@
     <p:sldMasterId id="2147483648" r:id="rId1"/>
   </p:sldMasterIdLst>
   <p:notesMasterIdLst>
-    <p:notesMasterId r:id="rId29"/>
+    <p:notesMasterId r:id="rId30"/>
   </p:notesMasterIdLst>
   <p:sldIdLst>
     <p:sldId id="259" r:id="rId2"/>
@@ -34,7 +34,8 @@
     <p:sldId id="301" r:id="rId25"/>
     <p:sldId id="302" r:id="rId26"/>
     <p:sldId id="276" r:id="rId27"/>
-    <p:sldId id="303" r:id="rId28"/>
+    <p:sldId id="305" r:id="rId28"/>
+    <p:sldId id="304" r:id="rId29"/>
   </p:sldIdLst>
   <p:sldSz cx="12192000" cy="6858000"/>
   <p:notesSz cx="6858000" cy="9144000"/>
@@ -234,7 +235,7 @@
           <a:p>
             <a:fld id="{19104133-B5B0-4351-8158-4F0E5EB1E2BF}" type="datetimeFigureOut">
               <a:rPr lang="en-US" smtClean="0"/>
-              <a:t>7/31/2019</a:t>
+              <a:t>10/24/2019</a:t>
             </a:fld>
             <a:endParaRPr lang="en-US"/>
           </a:p>
@@ -547,13 +548,36 @@
           <a:lstStyle/>
           <a:p>
             <a:r>
+              <a:rPr lang="en-US" b="1" dirty="0" smtClean="0"/>
+              <a:t>OPTION</a:t>
+            </a:r>
+            <a:r>
+              <a:rPr lang="en-US" b="1" baseline="0" dirty="0" smtClean="0"/>
+              <a:t> ONE: </a:t>
+            </a:r>
+            <a:r>
               <a:rPr lang="en-US" dirty="0" smtClean="0"/>
-              <a:t>Students should write down questions</a:t>
+              <a:t>Students </a:t>
+            </a:r>
+            <a:r>
+              <a:rPr lang="en-US" dirty="0" smtClean="0"/>
+              <a:t>should write down questions</a:t>
             </a:r>
             <a:r>
               <a:rPr lang="en-US" baseline="0" dirty="0" smtClean="0"/>
               <a:t> on post-it notes. Instructors can collect the post it notes. Then, one-by-one, each student will tell the group their name, their school, their grade level, and their answer to a random question.</a:t>
             </a:r>
+          </a:p>
+          <a:p>
+            <a:r>
+              <a:rPr lang="en-US" b="1" baseline="0" dirty="0" smtClean="0"/>
+              <a:t>OPTION TWO:</a:t>
+            </a:r>
+            <a:r>
+              <a:rPr lang="en-US" b="0" baseline="0" dirty="0" smtClean="0"/>
+              <a:t> Students write down questions on pieces of paper. They then crumple up their paper and throw it at each other for a while. At a certain point, the instructor should stop and make everyone grab a ball of paper. Each student will have to answer the question on the paper.</a:t>
+            </a:r>
+            <a:endParaRPr lang="en-US" b="1" baseline="0" dirty="0" smtClean="0"/>
           </a:p>
           <a:p>
             <a:endParaRPr lang="en-US" baseline="0" dirty="0" smtClean="0"/>
@@ -2225,13 +2249,17 @@
             </a:r>
             <a:r>
               <a:rPr lang="en-US" baseline="0" dirty="0" smtClean="0"/>
-              <a:t> URL. This will contain the instructions for </a:t>
-            </a:r>
-            <a:r>
-              <a:rPr lang="en-US" baseline="0" smtClean="0"/>
-              <a:t>the activities.</a:t>
-            </a:r>
-            <a:endParaRPr lang="en-US"/>
+              <a:t> URL. This will contain the instructions for the </a:t>
+            </a:r>
+            <a:r>
+              <a:rPr lang="en-US" baseline="0" dirty="0" smtClean="0"/>
+              <a:t>challenge activities</a:t>
+            </a:r>
+            <a:r>
+              <a:rPr lang="en-US" baseline="0" dirty="0" smtClean="0"/>
+              <a:t>.</a:t>
+            </a:r>
+            <a:endParaRPr lang="en-US" dirty="0"/>
           </a:p>
         </p:txBody>
       </p:sp>
@@ -2252,7 +2280,7 @@
           <a:p>
             <a:fld id="{DEC8F7F9-57EC-49CF-9FCD-2B781E4B449F}" type="slidenum">
               <a:rPr lang="en-US" smtClean="0"/>
-              <a:t>27</a:t>
+              <a:t>28</a:t>
             </a:fld>
             <a:endParaRPr lang="en-US"/>
           </a:p>
@@ -2261,7 +2289,7 @@
     </p:spTree>
     <p:extLst>
       <p:ext uri="{BB962C8B-B14F-4D97-AF65-F5344CB8AC3E}">
-        <p14:creationId xmlns:p14="http://schemas.microsoft.com/office/powerpoint/2010/main" val="700969359"/>
+        <p14:creationId xmlns:p14="http://schemas.microsoft.com/office/powerpoint/2010/main" val="1162618150"/>
       </p:ext>
     </p:extLst>
   </p:cSld>
@@ -2317,15 +2345,7 @@
           <a:p>
             <a:r>
               <a:rPr lang="en-US" dirty="0" smtClean="0"/>
-              <a:t>Direct the students to </a:t>
-            </a:r>
-            <a:r>
-              <a:rPr lang="en-US" dirty="0" smtClean="0"/>
-              <a:t>trinket, </a:t>
-            </a:r>
-            <a:r>
-              <a:rPr lang="en-US" dirty="0" smtClean="0"/>
-              <a:t>and have them follow along with the presentation.</a:t>
+              <a:t>Direct the students to trinket, and have them follow along with the presentation.</a:t>
             </a:r>
             <a:endParaRPr lang="en-US" dirty="0"/>
           </a:p>
@@ -3157,7 +3177,7 @@
             <a:fld id="{1C2D31DE-C454-491C-B5C3-F097855E3DF7}" type="datetime4">
               <a:rPr lang="en-US" smtClean="0"/>
               <a:pPr/>
-              <a:t>July 31, 2019</a:t>
+              <a:t>October 24, 2019</a:t>
             </a:fld>
             <a:endParaRPr lang="en-US" dirty="0"/>
           </a:p>
@@ -6557,7 +6577,7 @@
           <a:p>
             <a:fld id="{5958763E-B898-436D-883D-03711491D54A}" type="datetimeFigureOut">
               <a:rPr lang="en-US" smtClean="0"/>
-              <a:t>7/31/2019</a:t>
+              <a:t>10/24/2019</a:t>
             </a:fld>
             <a:endParaRPr lang="en-US"/>
           </a:p>
@@ -6758,7 +6778,7 @@
           <a:p>
             <a:fld id="{5958763E-B898-436D-883D-03711491D54A}" type="datetimeFigureOut">
               <a:rPr lang="en-US" smtClean="0"/>
-              <a:t>7/31/2019</a:t>
+              <a:t>10/24/2019</a:t>
             </a:fld>
             <a:endParaRPr lang="en-US"/>
           </a:p>
@@ -7015,7 +7035,7 @@
           <a:p>
             <a:fld id="{5958763E-B898-436D-883D-03711491D54A}" type="datetimeFigureOut">
               <a:rPr lang="en-US" smtClean="0"/>
-              <a:t>7/31/2019</a:t>
+              <a:t>10/24/2019</a:t>
             </a:fld>
             <a:endParaRPr lang="en-US"/>
           </a:p>
@@ -7370,7 +7390,7 @@
           <a:p>
             <a:fld id="{5958763E-B898-436D-883D-03711491D54A}" type="datetimeFigureOut">
               <a:rPr lang="en-US" smtClean="0"/>
-              <a:t>7/31/2019</a:t>
+              <a:t>10/24/2019</a:t>
             </a:fld>
             <a:endParaRPr lang="en-US"/>
           </a:p>
@@ -7793,7 +7813,7 @@
           <a:p>
             <a:fld id="{5958763E-B898-436D-883D-03711491D54A}" type="datetimeFigureOut">
               <a:rPr lang="en-US" smtClean="0"/>
-              <a:t>7/31/2019</a:t>
+              <a:t>10/24/2019</a:t>
             </a:fld>
             <a:endParaRPr lang="en-US"/>
           </a:p>
@@ -8301,7 +8321,7 @@
           <a:p>
             <a:fld id="{5958763E-B898-436D-883D-03711491D54A}" type="datetimeFigureOut">
               <a:rPr lang="en-US" smtClean="0"/>
-              <a:t>7/31/2019</a:t>
+              <a:t>10/24/2019</a:t>
             </a:fld>
             <a:endParaRPr lang="en-US"/>
           </a:p>
@@ -8759,7 +8779,7 @@
           <a:p>
             <a:fld id="{5958763E-B898-436D-883D-03711491D54A}" type="datetimeFigureOut">
               <a:rPr lang="en-US" smtClean="0"/>
-              <a:t>7/31/2019</a:t>
+              <a:t>10/24/2019</a:t>
             </a:fld>
             <a:endParaRPr lang="en-US"/>
           </a:p>
@@ -9377,7 +9397,7 @@
           <a:p>
             <a:fld id="{5958763E-B898-436D-883D-03711491D54A}" type="datetimeFigureOut">
               <a:rPr lang="en-US" smtClean="0"/>
-              <a:t>7/31/2019</a:t>
+              <a:t>10/24/2019</a:t>
             </a:fld>
             <a:endParaRPr lang="en-US"/>
           </a:p>
@@ -10155,7 +10175,7 @@
           <a:p>
             <a:fld id="{5958763E-B898-436D-883D-03711491D54A}" type="datetimeFigureOut">
               <a:rPr lang="en-US" smtClean="0"/>
-              <a:t>7/31/2019</a:t>
+              <a:t>10/24/2019</a:t>
             </a:fld>
             <a:endParaRPr lang="en-US"/>
           </a:p>
@@ -10266,7 +10286,7 @@
           <a:p>
             <a:fld id="{5958763E-B898-436D-883D-03711491D54A}" type="datetimeFigureOut">
               <a:rPr lang="en-US" smtClean="0"/>
-              <a:t>7/31/2019</a:t>
+              <a:t>10/24/2019</a:t>
             </a:fld>
             <a:endParaRPr lang="en-US"/>
           </a:p>
@@ -10608,7 +10628,7 @@
             <a:fld id="{1C2D31DE-C454-491C-B5C3-F097855E3DF7}" type="datetime4">
               <a:rPr lang="en-US" smtClean="0"/>
               <a:pPr/>
-              <a:t>July 31, 2019</a:t>
+              <a:t>October 24, 2019</a:t>
             </a:fld>
             <a:endParaRPr lang="en-US" dirty="0"/>
           </a:p>
@@ -13768,7 +13788,7 @@
           <a:p>
             <a:fld id="{5958763E-B898-436D-883D-03711491D54A}" type="datetimeFigureOut">
               <a:rPr lang="en-US" smtClean="0"/>
-              <a:t>7/31/2019</a:t>
+              <a:t>10/24/2019</a:t>
             </a:fld>
             <a:endParaRPr lang="en-US"/>
           </a:p>
@@ -13899,7 +13919,7 @@
           <a:p>
             <a:fld id="{5958763E-B898-436D-883D-03711491D54A}" type="datetimeFigureOut">
               <a:rPr lang="en-US" smtClean="0"/>
-              <a:t>7/31/2019</a:t>
+              <a:t>10/24/2019</a:t>
             </a:fld>
             <a:endParaRPr lang="en-US"/>
           </a:p>
@@ -14030,7 +14050,7 @@
           <a:p>
             <a:fld id="{5958763E-B898-436D-883D-03711491D54A}" type="datetimeFigureOut">
               <a:rPr lang="en-US" smtClean="0"/>
-              <a:t>7/31/2019</a:t>
+              <a:t>10/24/2019</a:t>
             </a:fld>
             <a:endParaRPr lang="en-US"/>
           </a:p>
@@ -14161,7 +14181,7 @@
           <a:p>
             <a:fld id="{5958763E-B898-436D-883D-03711491D54A}" type="datetimeFigureOut">
               <a:rPr lang="en-US" smtClean="0"/>
-              <a:t>7/31/2019</a:t>
+              <a:t>10/24/2019</a:t>
             </a:fld>
             <a:endParaRPr lang="en-US"/>
           </a:p>
@@ -14292,7 +14312,7 @@
           <a:p>
             <a:fld id="{5958763E-B898-436D-883D-03711491D54A}" type="datetimeFigureOut">
               <a:rPr lang="en-US" smtClean="0"/>
-              <a:t>7/31/2019</a:t>
+              <a:t>10/24/2019</a:t>
             </a:fld>
             <a:endParaRPr lang="en-US"/>
           </a:p>
@@ -14423,7 +14443,7 @@
           <a:p>
             <a:fld id="{5958763E-B898-436D-883D-03711491D54A}" type="datetimeFigureOut">
               <a:rPr lang="en-US" smtClean="0"/>
-              <a:t>7/31/2019</a:t>
+              <a:t>10/24/2019</a:t>
             </a:fld>
             <a:endParaRPr lang="en-US"/>
           </a:p>
@@ -14554,7 +14574,7 @@
           <a:p>
             <a:fld id="{5958763E-B898-436D-883D-03711491D54A}" type="datetimeFigureOut">
               <a:rPr lang="en-US" smtClean="0"/>
-              <a:t>7/31/2019</a:t>
+              <a:t>10/24/2019</a:t>
             </a:fld>
             <a:endParaRPr lang="en-US"/>
           </a:p>
@@ -14685,7 +14705,7 @@
           <a:p>
             <a:fld id="{5958763E-B898-436D-883D-03711491D54A}" type="datetimeFigureOut">
               <a:rPr lang="en-US" smtClean="0"/>
-              <a:t>7/31/2019</a:t>
+              <a:t>10/24/2019</a:t>
             </a:fld>
             <a:endParaRPr lang="en-US"/>
           </a:p>
@@ -14825,7 +14845,7 @@
           <a:p>
             <a:fld id="{5958763E-B898-436D-883D-03711491D54A}" type="datetimeFigureOut">
               <a:rPr lang="en-US" smtClean="0"/>
-              <a:t>7/31/2019</a:t>
+              <a:t>10/24/2019</a:t>
             </a:fld>
             <a:endParaRPr lang="en-US"/>
           </a:p>
@@ -18186,7 +18206,7 @@
             <a:fld id="{1C2D31DE-C454-491C-B5C3-F097855E3DF7}" type="datetime4">
               <a:rPr lang="en-US" smtClean="0"/>
               <a:pPr/>
-              <a:t>July 31, 2019</a:t>
+              <a:t>October 24, 2019</a:t>
             </a:fld>
             <a:endParaRPr lang="en-US" dirty="0"/>
           </a:p>
@@ -30431,7 +30451,7 @@
           <a:p>
             <a:fld id="{5958763E-B898-436D-883D-03711491D54A}" type="datetimeFigureOut">
               <a:rPr lang="en-US" smtClean="0"/>
-              <a:t>7/31/2019</a:t>
+              <a:t>10/24/2019</a:t>
             </a:fld>
             <a:endParaRPr lang="en-US"/>
           </a:p>
@@ -30840,7 +30860,7 @@
           <a:p>
             <a:fld id="{5958763E-B898-436D-883D-03711491D54A}" type="datetimeFigureOut">
               <a:rPr lang="en-US" smtClean="0"/>
-              <a:t>7/31/2019</a:t>
+              <a:t>10/24/2019</a:t>
             </a:fld>
             <a:endParaRPr lang="en-US"/>
           </a:p>
@@ -31141,7 +31161,7 @@
           <a:p>
             <a:fld id="{5958763E-B898-436D-883D-03711491D54A}" type="datetimeFigureOut">
               <a:rPr lang="en-US" smtClean="0"/>
-              <a:t>7/31/2019</a:t>
+              <a:t>10/24/2019</a:t>
             </a:fld>
             <a:endParaRPr lang="en-US"/>
           </a:p>
@@ -31349,7 +31369,7 @@
           <a:p>
             <a:fld id="{5958763E-B898-436D-883D-03711491D54A}" type="datetimeFigureOut">
               <a:rPr lang="en-US" smtClean="0"/>
-              <a:t>7/31/2019</a:t>
+              <a:t>10/24/2019</a:t>
             </a:fld>
             <a:endParaRPr lang="en-US"/>
           </a:p>
@@ -31617,7 +31637,7 @@
           <a:p>
             <a:fld id="{5958763E-B898-436D-883D-03711491D54A}" type="datetimeFigureOut">
               <a:rPr lang="en-US" smtClean="0"/>
-              <a:t>7/31/2019</a:t>
+              <a:t>10/24/2019</a:t>
             </a:fld>
             <a:endParaRPr lang="en-US"/>
           </a:p>
@@ -32134,7 +32154,7 @@
           <a:p>
             <a:fld id="{5958763E-B898-436D-883D-03711491D54A}" type="datetimeFigureOut">
               <a:rPr lang="en-US" smtClean="0"/>
-              <a:t>7/31/2019</a:t>
+              <a:t>10/24/2019</a:t>
             </a:fld>
             <a:endParaRPr lang="en-US"/>
           </a:p>
@@ -32622,7 +32642,7 @@
           <a:p>
             <a:fld id="{5958763E-B898-436D-883D-03711491D54A}" type="datetimeFigureOut">
               <a:rPr lang="en-US" smtClean="0"/>
-              <a:t>7/31/2019</a:t>
+              <a:t>10/24/2019</a:t>
             </a:fld>
             <a:endParaRPr lang="en-US"/>
           </a:p>
@@ -33448,7 +33468,7 @@
           <a:p>
             <a:fld id="{5958763E-B898-436D-883D-03711491D54A}" type="datetimeFigureOut">
               <a:rPr lang="en-US" smtClean="0"/>
-              <a:t>7/31/2019</a:t>
+              <a:t>10/24/2019</a:t>
             </a:fld>
             <a:endParaRPr lang="en-US"/>
           </a:p>
@@ -33656,7 +33676,7 @@
           <a:p>
             <a:fld id="{5958763E-B898-436D-883D-03711491D54A}" type="datetimeFigureOut">
               <a:rPr lang="en-US" smtClean="0"/>
-              <a:t>7/31/2019</a:t>
+              <a:t>10/24/2019</a:t>
             </a:fld>
             <a:endParaRPr lang="en-US"/>
           </a:p>
@@ -33998,7 +34018,7 @@
           <a:p>
             <a:fld id="{5958763E-B898-436D-883D-03711491D54A}" type="datetimeFigureOut">
               <a:rPr lang="en-US" smtClean="0"/>
-              <a:t>7/31/2019</a:t>
+              <a:t>10/24/2019</a:t>
             </a:fld>
             <a:endParaRPr lang="en-US"/>
           </a:p>
@@ -34235,7 +34255,7 @@
           <a:p>
             <a:fld id="{5958763E-B898-436D-883D-03711491D54A}" type="datetimeFigureOut">
               <a:rPr lang="en-US" smtClean="0"/>
-              <a:t>7/31/2019</a:t>
+              <a:t>10/24/2019</a:t>
             </a:fld>
             <a:endParaRPr lang="en-US"/>
           </a:p>
@@ -34486,7 +34506,7 @@
           <a:p>
             <a:fld id="{5958763E-B898-436D-883D-03711491D54A}" type="datetimeFigureOut">
               <a:rPr lang="en-US" smtClean="0"/>
-              <a:t>7/31/2019</a:t>
+              <a:t>10/24/2019</a:t>
             </a:fld>
             <a:endParaRPr lang="en-US"/>
           </a:p>
@@ -42898,7 +42918,7 @@
             <a:fld id="{1C2D31DE-C454-491C-B5C3-F097855E3DF7}" type="datetime4">
               <a:rPr lang="en-US" smtClean="0"/>
               <a:pPr/>
-              <a:t>July 31, 2019</a:t>
+              <a:t>October 24, 2019</a:t>
             </a:fld>
             <a:endParaRPr lang="en-US" dirty="0"/>
           </a:p>
@@ -45451,6 +45471,108 @@
           <a:chExt cx="0" cy="0"/>
         </a:xfrm>
       </p:grpSpPr>
+      <p:pic>
+        <p:nvPicPr>
+          <p:cNvPr id="1026" name="Picture 2" descr="Image result for python turtle square gif"/>
+          <p:cNvPicPr>
+            <a:picLocks noGrp="1" noChangeAspect="1" noChangeArrowheads="1" noCrop="1"/>
+          </p:cNvPicPr>
+          <p:nvPr>
+            <p:ph type="pic" sz="quarter" idx="13"/>
+          </p:nvPr>
+        </p:nvPicPr>
+        <p:blipFill>
+          <a:blip r:embed="rId2">
+            <a:extLst>
+              <a:ext uri="{28A0092B-C50C-407E-A947-70E740481C1C}">
+                <a14:useLocalDpi xmlns:a14="http://schemas.microsoft.com/office/drawing/2010/main" val="0"/>
+              </a:ext>
+            </a:extLst>
+          </a:blip>
+          <a:srcRect t="12762" b="12762"/>
+          <a:stretch>
+            <a:fillRect/>
+          </a:stretch>
+        </p:blipFill>
+        <p:spPr bwMode="auto">
+          <a:prstGeom prst="rect">
+            <a:avLst/>
+          </a:prstGeom>
+          <a:noFill/>
+          <a:extLst>
+            <a:ext uri="{909E8E84-426E-40DD-AFC4-6F175D3DCCD1}">
+              <a14:hiddenFill xmlns:a14="http://schemas.microsoft.com/office/drawing/2010/main">
+                <a:solidFill>
+                  <a:srgbClr val="FFFFFF"/>
+                </a:solidFill>
+              </a14:hiddenFill>
+            </a:ext>
+          </a:extLst>
+        </p:spPr>
+      </p:pic>
+      <p:sp>
+        <p:nvSpPr>
+          <p:cNvPr id="3" name="Title 2"/>
+          <p:cNvSpPr>
+            <a:spLocks noGrp="1"/>
+          </p:cNvSpPr>
+          <p:nvPr>
+            <p:ph type="title"/>
+          </p:nvPr>
+        </p:nvSpPr>
+        <p:spPr/>
+        <p:txBody>
+          <a:bodyPr/>
+          <a:lstStyle/>
+          <a:p>
+            <a:r>
+              <a:rPr lang="en-US" dirty="0" smtClean="0"/>
+              <a:t>Follow-Along Activity</a:t>
+            </a:r>
+            <a:endParaRPr lang="en-US" dirty="0"/>
+          </a:p>
+        </p:txBody>
+      </p:sp>
+    </p:spTree>
+    <p:extLst>
+      <p:ext uri="{BB962C8B-B14F-4D97-AF65-F5344CB8AC3E}">
+        <p14:creationId xmlns:p14="http://schemas.microsoft.com/office/powerpoint/2010/main" val="4206450011"/>
+      </p:ext>
+    </p:extLst>
+  </p:cSld>
+  <p:clrMapOvr>
+    <a:masterClrMapping/>
+  </p:clrMapOvr>
+  <p:transition>
+    <p:fade/>
+  </p:transition>
+  <p:timing>
+    <p:tnLst>
+      <p:par>
+        <p:cTn id="1" dur="indefinite" restart="never" nodeType="tmRoot"/>
+      </p:par>
+    </p:tnLst>
+  </p:timing>
+</p:sld>
+</file>
+
+<file path=ppt/slides/slide28.xml><?xml version="1.0" encoding="utf-8"?>
+<p:sld xmlns:a="http://schemas.openxmlformats.org/drawingml/2006/main" xmlns:r="http://schemas.openxmlformats.org/officeDocument/2006/relationships" xmlns:p="http://schemas.openxmlformats.org/presentationml/2006/main">
+  <p:cSld>
+    <p:spTree>
+      <p:nvGrpSpPr>
+        <p:cNvPr id="1" name=""/>
+        <p:cNvGrpSpPr/>
+        <p:nvPr/>
+      </p:nvGrpSpPr>
+      <p:grpSpPr>
+        <a:xfrm>
+          <a:off x="0" y="0"/>
+          <a:ext cx="0" cy="0"/>
+          <a:chOff x="0" y="0"/>
+          <a:chExt cx="0" cy="0"/>
+        </a:xfrm>
+      </p:grpSpPr>
       <p:sp>
         <p:nvSpPr>
           <p:cNvPr id="2" name="Title 1"/>
@@ -45495,19 +45617,25 @@
               <a:buNone/>
             </a:pPr>
             <a:r>
-              <a:rPr lang="en-US" sz="11500" dirty="0" smtClean="0">
+              <a:rPr lang="en-US" sz="9600" dirty="0" smtClean="0">
                 <a:hlinkClick r:id="rId3"/>
               </a:rPr>
-              <a:t>bit.ly/2X2REJn</a:t>
-            </a:r>
-            <a:endParaRPr lang="en-US" sz="11500" dirty="0"/>
+              <a:t>bit.ly/</a:t>
+            </a:r>
+            <a:r>
+              <a:rPr lang="en-US" sz="9600" dirty="0" err="1" smtClean="0">
+                <a:hlinkClick r:id="rId3"/>
+              </a:rPr>
+              <a:t>PyChallenges</a:t>
+            </a:r>
+            <a:endParaRPr lang="en-US" sz="9600" dirty="0"/>
           </a:p>
         </p:txBody>
       </p:sp>
     </p:spTree>
     <p:extLst>
       <p:ext uri="{BB962C8B-B14F-4D97-AF65-F5344CB8AC3E}">
-        <p14:creationId xmlns:p14="http://schemas.microsoft.com/office/powerpoint/2010/main" val="592313395"/>
+        <p14:creationId xmlns:p14="http://schemas.microsoft.com/office/powerpoint/2010/main" val="3314393105"/>
       </p:ext>
     </p:extLst>
   </p:cSld>
@@ -45517,6 +45645,13 @@
   <p:transition>
     <p:fade/>
   </p:transition>
+  <p:timing>
+    <p:tnLst>
+      <p:par>
+        <p:cTn id="1" dur="indefinite" restart="never" nodeType="tmRoot"/>
+      </p:par>
+    </p:tnLst>
+  </p:timing>
 </p:sld>
 </file>
 
@@ -46858,18 +46993,29 @@
                 <a:solidFill>
                   <a:schemeClr val="accent2"/>
                 </a:solidFill>
+                <a:hlinkClick r:id="rId3"/>
               </a:rPr>
-              <a:t>bit.ly/2SVHjyp</a:t>
-            </a:r>
+              <a:t>bit.ly/</a:t>
+            </a:r>
+            <a:r>
+              <a:rPr lang="en-US" sz="6000" u="sng" dirty="0" err="1" smtClean="0">
+                <a:solidFill>
+                  <a:schemeClr val="accent2"/>
+                </a:solidFill>
+                <a:hlinkClick r:id="rId3"/>
+              </a:rPr>
+              <a:t>PyTrinket</a:t>
+            </a:r>
+            <a:endParaRPr lang="en-US" sz="6000" u="sng" dirty="0" smtClean="0">
+              <a:solidFill>
+                <a:schemeClr val="accent2"/>
+              </a:solidFill>
+            </a:endParaRPr>
           </a:p>
           <a:p>
             <a:r>
               <a:rPr lang="en-US" dirty="0" smtClean="0"/>
-              <a:t>Click </a:t>
-            </a:r>
-            <a:r>
-              <a:rPr lang="en-US" dirty="0" smtClean="0"/>
-              <a:t>the hamburger menu in the upper left, then click “</a:t>
+              <a:t>Click the hamburger menu in the upper left, then click “</a:t>
             </a:r>
             <a:r>
               <a:rPr lang="en-US" dirty="0" err="1" smtClean="0"/>
@@ -46904,7 +47050,7 @@
           <p:nvPr/>
         </p:nvPicPr>
         <p:blipFill>
-          <a:blip r:embed="rId3"/>
+          <a:blip r:embed="rId4"/>
           <a:stretch>
             <a:fillRect/>
           </a:stretch>
@@ -46928,7 +47074,7 @@
           <p:nvPr/>
         </p:nvPicPr>
         <p:blipFill>
-          <a:blip r:embed="rId4"/>
+          <a:blip r:embed="rId5"/>
           <a:stretch>
             <a:fillRect/>
           </a:stretch>

</xml_diff>